<commit_message>
Adding FieldLists to website
</commit_message>
<xml_diff>
--- a/images/parcelsdesign.pptx
+++ b/images/parcelsdesign.pptx
@@ -154,10 +154,9 @@
           </a:lstStyle>
           <a:p>
             <a:r>
-              <a:rPr lang="en-US" smtClean="0"/>
+              <a:rPr lang="en-US"/>
               <a:t>Click to edit Master title style</a:t>
             </a:r>
-            <a:endParaRPr lang="en-US"/>
           </a:p>
         </p:txBody>
       </p:sp>
@@ -219,10 +218,9 @@
           </a:lstStyle>
           <a:p>
             <a:r>
-              <a:rPr lang="en-US" smtClean="0"/>
+              <a:rPr lang="en-US"/>
               <a:t>Click to edit Master subtitle style</a:t>
             </a:r>
-            <a:endParaRPr lang="en-US"/>
           </a:p>
         </p:txBody>
       </p:sp>
@@ -243,7 +241,7 @@
           <a:p>
             <a:fld id="{7D3EDCAD-2FF9-9B40-90C5-6D68A2560007}" type="datetimeFigureOut">
               <a:rPr lang="en-US" smtClean="0"/>
-              <a:t>3/12/17</a:t>
+              <a:t>7/20/18</a:t>
             </a:fld>
             <a:endParaRPr lang="en-US"/>
           </a:p>
@@ -337,10 +335,9 @@
           <a:lstStyle/>
           <a:p>
             <a:r>
-              <a:rPr lang="en-US" smtClean="0"/>
+              <a:rPr lang="en-US"/>
               <a:t>Click to edit Master title style</a:t>
             </a:r>
-            <a:endParaRPr lang="en-US"/>
           </a:p>
         </p:txBody>
       </p:sp>
@@ -361,38 +358,37 @@
           <a:p>
             <a:pPr lvl="0"/>
             <a:r>
-              <a:rPr lang="en-US" smtClean="0"/>
+              <a:rPr lang="en-US"/>
               <a:t>Click to edit Master text styles</a:t>
             </a:r>
           </a:p>
           <a:p>
             <a:pPr lvl="1"/>
             <a:r>
-              <a:rPr lang="en-US" smtClean="0"/>
+              <a:rPr lang="en-US"/>
               <a:t>Second level</a:t>
             </a:r>
           </a:p>
           <a:p>
             <a:pPr lvl="2"/>
             <a:r>
-              <a:rPr lang="en-US" smtClean="0"/>
+              <a:rPr lang="en-US"/>
               <a:t>Third level</a:t>
             </a:r>
           </a:p>
           <a:p>
             <a:pPr lvl="3"/>
             <a:r>
-              <a:rPr lang="en-US" smtClean="0"/>
+              <a:rPr lang="en-US"/>
               <a:t>Fourth level</a:t>
             </a:r>
           </a:p>
           <a:p>
             <a:pPr lvl="4"/>
             <a:r>
-              <a:rPr lang="en-US" smtClean="0"/>
+              <a:rPr lang="en-US"/>
               <a:t>Fifth level</a:t>
             </a:r>
-            <a:endParaRPr lang="en-US"/>
           </a:p>
         </p:txBody>
       </p:sp>
@@ -413,7 +409,7 @@
           <a:p>
             <a:fld id="{7D3EDCAD-2FF9-9B40-90C5-6D68A2560007}" type="datetimeFigureOut">
               <a:rPr lang="en-US" smtClean="0"/>
-              <a:t>3/12/17</a:t>
+              <a:t>7/20/18</a:t>
             </a:fld>
             <a:endParaRPr lang="en-US"/>
           </a:p>
@@ -512,10 +508,9 @@
           <a:lstStyle/>
           <a:p>
             <a:r>
-              <a:rPr lang="en-US" smtClean="0"/>
+              <a:rPr lang="en-US"/>
               <a:t>Click to edit Master title style</a:t>
             </a:r>
-            <a:endParaRPr lang="en-US"/>
           </a:p>
         </p:txBody>
       </p:sp>
@@ -541,38 +536,37 @@
           <a:p>
             <a:pPr lvl="0"/>
             <a:r>
-              <a:rPr lang="en-US" smtClean="0"/>
+              <a:rPr lang="en-US"/>
               <a:t>Click to edit Master text styles</a:t>
             </a:r>
           </a:p>
           <a:p>
             <a:pPr lvl="1"/>
             <a:r>
-              <a:rPr lang="en-US" smtClean="0"/>
+              <a:rPr lang="en-US"/>
               <a:t>Second level</a:t>
             </a:r>
           </a:p>
           <a:p>
             <a:pPr lvl="2"/>
             <a:r>
-              <a:rPr lang="en-US" smtClean="0"/>
+              <a:rPr lang="en-US"/>
               <a:t>Third level</a:t>
             </a:r>
           </a:p>
           <a:p>
             <a:pPr lvl="3"/>
             <a:r>
-              <a:rPr lang="en-US" smtClean="0"/>
+              <a:rPr lang="en-US"/>
               <a:t>Fourth level</a:t>
             </a:r>
           </a:p>
           <a:p>
             <a:pPr lvl="4"/>
             <a:r>
-              <a:rPr lang="en-US" smtClean="0"/>
+              <a:rPr lang="en-US"/>
               <a:t>Fifth level</a:t>
             </a:r>
-            <a:endParaRPr lang="en-US"/>
           </a:p>
         </p:txBody>
       </p:sp>
@@ -593,7 +587,7 @@
           <a:p>
             <a:fld id="{7D3EDCAD-2FF9-9B40-90C5-6D68A2560007}" type="datetimeFigureOut">
               <a:rPr lang="en-US" smtClean="0"/>
-              <a:t>3/12/17</a:t>
+              <a:t>7/20/18</a:t>
             </a:fld>
             <a:endParaRPr lang="en-US"/>
           </a:p>
@@ -687,10 +681,9 @@
           <a:lstStyle/>
           <a:p>
             <a:r>
-              <a:rPr lang="en-US" smtClean="0"/>
+              <a:rPr lang="en-US"/>
               <a:t>Click to edit Master title style</a:t>
             </a:r>
-            <a:endParaRPr lang="en-US"/>
           </a:p>
         </p:txBody>
       </p:sp>
@@ -711,38 +704,37 @@
           <a:p>
             <a:pPr lvl="0"/>
             <a:r>
-              <a:rPr lang="en-US" smtClean="0"/>
+              <a:rPr lang="en-US"/>
               <a:t>Click to edit Master text styles</a:t>
             </a:r>
           </a:p>
           <a:p>
             <a:pPr lvl="1"/>
             <a:r>
-              <a:rPr lang="en-US" smtClean="0"/>
+              <a:rPr lang="en-US"/>
               <a:t>Second level</a:t>
             </a:r>
           </a:p>
           <a:p>
             <a:pPr lvl="2"/>
             <a:r>
-              <a:rPr lang="en-US" smtClean="0"/>
+              <a:rPr lang="en-US"/>
               <a:t>Third level</a:t>
             </a:r>
           </a:p>
           <a:p>
             <a:pPr lvl="3"/>
             <a:r>
-              <a:rPr lang="en-US" smtClean="0"/>
+              <a:rPr lang="en-US"/>
               <a:t>Fourth level</a:t>
             </a:r>
           </a:p>
           <a:p>
             <a:pPr lvl="4"/>
             <a:r>
-              <a:rPr lang="en-US" smtClean="0"/>
+              <a:rPr lang="en-US"/>
               <a:t>Fifth level</a:t>
             </a:r>
-            <a:endParaRPr lang="en-US"/>
           </a:p>
         </p:txBody>
       </p:sp>
@@ -763,7 +755,7 @@
           <a:p>
             <a:fld id="{7D3EDCAD-2FF9-9B40-90C5-6D68A2560007}" type="datetimeFigureOut">
               <a:rPr lang="en-US" smtClean="0"/>
-              <a:t>3/12/17</a:t>
+              <a:t>7/20/18</a:t>
             </a:fld>
             <a:endParaRPr lang="en-US"/>
           </a:p>
@@ -866,10 +858,9 @@
           </a:lstStyle>
           <a:p>
             <a:r>
-              <a:rPr lang="en-US" smtClean="0"/>
+              <a:rPr lang="en-US"/>
               <a:t>Click to edit Master title style</a:t>
             </a:r>
-            <a:endParaRPr lang="en-US"/>
           </a:p>
         </p:txBody>
       </p:sp>
@@ -986,7 +977,7 @@
           <a:p>
             <a:pPr lvl="0"/>
             <a:r>
-              <a:rPr lang="en-US" smtClean="0"/>
+              <a:rPr lang="en-US"/>
               <a:t>Click to edit Master text styles</a:t>
             </a:r>
           </a:p>
@@ -1009,7 +1000,7 @@
           <a:p>
             <a:fld id="{7D3EDCAD-2FF9-9B40-90C5-6D68A2560007}" type="datetimeFigureOut">
               <a:rPr lang="en-US" smtClean="0"/>
-              <a:t>3/12/17</a:t>
+              <a:t>7/20/18</a:t>
             </a:fld>
             <a:endParaRPr lang="en-US"/>
           </a:p>
@@ -1103,10 +1094,9 @@
           <a:lstStyle/>
           <a:p>
             <a:r>
-              <a:rPr lang="en-US" smtClean="0"/>
+              <a:rPr lang="en-US"/>
               <a:t>Click to edit Master title style</a:t>
             </a:r>
-            <a:endParaRPr lang="en-US"/>
           </a:p>
         </p:txBody>
       </p:sp>
@@ -1132,38 +1122,37 @@
           <a:p>
             <a:pPr lvl="0"/>
             <a:r>
-              <a:rPr lang="en-US" smtClean="0"/>
+              <a:rPr lang="en-US"/>
               <a:t>Click to edit Master text styles</a:t>
             </a:r>
           </a:p>
           <a:p>
             <a:pPr lvl="1"/>
             <a:r>
-              <a:rPr lang="en-US" smtClean="0"/>
+              <a:rPr lang="en-US"/>
               <a:t>Second level</a:t>
             </a:r>
           </a:p>
           <a:p>
             <a:pPr lvl="2"/>
             <a:r>
-              <a:rPr lang="en-US" smtClean="0"/>
+              <a:rPr lang="en-US"/>
               <a:t>Third level</a:t>
             </a:r>
           </a:p>
           <a:p>
             <a:pPr lvl="3"/>
             <a:r>
-              <a:rPr lang="en-US" smtClean="0"/>
+              <a:rPr lang="en-US"/>
               <a:t>Fourth level</a:t>
             </a:r>
           </a:p>
           <a:p>
             <a:pPr lvl="4"/>
             <a:r>
-              <a:rPr lang="en-US" smtClean="0"/>
+              <a:rPr lang="en-US"/>
               <a:t>Fifth level</a:t>
             </a:r>
-            <a:endParaRPr lang="en-US"/>
           </a:p>
         </p:txBody>
       </p:sp>
@@ -1189,38 +1178,37 @@
           <a:p>
             <a:pPr lvl="0"/>
             <a:r>
-              <a:rPr lang="en-US" smtClean="0"/>
+              <a:rPr lang="en-US"/>
               <a:t>Click to edit Master text styles</a:t>
             </a:r>
           </a:p>
           <a:p>
             <a:pPr lvl="1"/>
             <a:r>
-              <a:rPr lang="en-US" smtClean="0"/>
+              <a:rPr lang="en-US"/>
               <a:t>Second level</a:t>
             </a:r>
           </a:p>
           <a:p>
             <a:pPr lvl="2"/>
             <a:r>
-              <a:rPr lang="en-US" smtClean="0"/>
+              <a:rPr lang="en-US"/>
               <a:t>Third level</a:t>
             </a:r>
           </a:p>
           <a:p>
             <a:pPr lvl="3"/>
             <a:r>
-              <a:rPr lang="en-US" smtClean="0"/>
+              <a:rPr lang="en-US"/>
               <a:t>Fourth level</a:t>
             </a:r>
           </a:p>
           <a:p>
             <a:pPr lvl="4"/>
             <a:r>
-              <a:rPr lang="en-US" smtClean="0"/>
+              <a:rPr lang="en-US"/>
               <a:t>Fifth level</a:t>
             </a:r>
-            <a:endParaRPr lang="en-US"/>
           </a:p>
         </p:txBody>
       </p:sp>
@@ -1241,7 +1229,7 @@
           <a:p>
             <a:fld id="{7D3EDCAD-2FF9-9B40-90C5-6D68A2560007}" type="datetimeFigureOut">
               <a:rPr lang="en-US" smtClean="0"/>
-              <a:t>3/12/17</a:t>
+              <a:t>7/20/18</a:t>
             </a:fld>
             <a:endParaRPr lang="en-US"/>
           </a:p>
@@ -1340,10 +1328,9 @@
           <a:lstStyle/>
           <a:p>
             <a:r>
-              <a:rPr lang="en-US" smtClean="0"/>
+              <a:rPr lang="en-US"/>
               <a:t>Click to edit Master title style</a:t>
             </a:r>
-            <a:endParaRPr lang="en-US"/>
           </a:p>
         </p:txBody>
       </p:sp>
@@ -1406,7 +1393,7 @@
           <a:p>
             <a:pPr lvl="0"/>
             <a:r>
-              <a:rPr lang="en-US" smtClean="0"/>
+              <a:rPr lang="en-US"/>
               <a:t>Click to edit Master text styles</a:t>
             </a:r>
           </a:p>
@@ -1434,38 +1421,37 @@
           <a:p>
             <a:pPr lvl="0"/>
             <a:r>
-              <a:rPr lang="en-US" smtClean="0"/>
+              <a:rPr lang="en-US"/>
               <a:t>Click to edit Master text styles</a:t>
             </a:r>
           </a:p>
           <a:p>
             <a:pPr lvl="1"/>
             <a:r>
-              <a:rPr lang="en-US" smtClean="0"/>
+              <a:rPr lang="en-US"/>
               <a:t>Second level</a:t>
             </a:r>
           </a:p>
           <a:p>
             <a:pPr lvl="2"/>
             <a:r>
-              <a:rPr lang="en-US" smtClean="0"/>
+              <a:rPr lang="en-US"/>
               <a:t>Third level</a:t>
             </a:r>
           </a:p>
           <a:p>
             <a:pPr lvl="3"/>
             <a:r>
-              <a:rPr lang="en-US" smtClean="0"/>
+              <a:rPr lang="en-US"/>
               <a:t>Fourth level</a:t>
             </a:r>
           </a:p>
           <a:p>
             <a:pPr lvl="4"/>
             <a:r>
-              <a:rPr lang="en-US" smtClean="0"/>
+              <a:rPr lang="en-US"/>
               <a:t>Fifth level</a:t>
             </a:r>
-            <a:endParaRPr lang="en-US"/>
           </a:p>
         </p:txBody>
       </p:sp>
@@ -1528,7 +1514,7 @@
           <a:p>
             <a:pPr lvl="0"/>
             <a:r>
-              <a:rPr lang="en-US" smtClean="0"/>
+              <a:rPr lang="en-US"/>
               <a:t>Click to edit Master text styles</a:t>
             </a:r>
           </a:p>
@@ -1556,38 +1542,37 @@
           <a:p>
             <a:pPr lvl="0"/>
             <a:r>
-              <a:rPr lang="en-US" smtClean="0"/>
+              <a:rPr lang="en-US"/>
               <a:t>Click to edit Master text styles</a:t>
             </a:r>
           </a:p>
           <a:p>
             <a:pPr lvl="1"/>
             <a:r>
-              <a:rPr lang="en-US" smtClean="0"/>
+              <a:rPr lang="en-US"/>
               <a:t>Second level</a:t>
             </a:r>
           </a:p>
           <a:p>
             <a:pPr lvl="2"/>
             <a:r>
-              <a:rPr lang="en-US" smtClean="0"/>
+              <a:rPr lang="en-US"/>
               <a:t>Third level</a:t>
             </a:r>
           </a:p>
           <a:p>
             <a:pPr lvl="3"/>
             <a:r>
-              <a:rPr lang="en-US" smtClean="0"/>
+              <a:rPr lang="en-US"/>
               <a:t>Fourth level</a:t>
             </a:r>
           </a:p>
           <a:p>
             <a:pPr lvl="4"/>
             <a:r>
-              <a:rPr lang="en-US" smtClean="0"/>
+              <a:rPr lang="en-US"/>
               <a:t>Fifth level</a:t>
             </a:r>
-            <a:endParaRPr lang="en-US"/>
           </a:p>
         </p:txBody>
       </p:sp>
@@ -1608,7 +1593,7 @@
           <a:p>
             <a:fld id="{7D3EDCAD-2FF9-9B40-90C5-6D68A2560007}" type="datetimeFigureOut">
               <a:rPr lang="en-US" smtClean="0"/>
-              <a:t>3/12/17</a:t>
+              <a:t>7/20/18</a:t>
             </a:fld>
             <a:endParaRPr lang="en-US"/>
           </a:p>
@@ -1702,10 +1687,9 @@
           <a:lstStyle/>
           <a:p>
             <a:r>
-              <a:rPr lang="en-US" smtClean="0"/>
+              <a:rPr lang="en-US"/>
               <a:t>Click to edit Master title style</a:t>
             </a:r>
-            <a:endParaRPr lang="en-US"/>
           </a:p>
         </p:txBody>
       </p:sp>
@@ -1726,7 +1710,7 @@
           <a:p>
             <a:fld id="{7D3EDCAD-2FF9-9B40-90C5-6D68A2560007}" type="datetimeFigureOut">
               <a:rPr lang="en-US" smtClean="0"/>
-              <a:t>3/12/17</a:t>
+              <a:t>7/20/18</a:t>
             </a:fld>
             <a:endParaRPr lang="en-US"/>
           </a:p>
@@ -1821,7 +1805,7 @@
           <a:p>
             <a:fld id="{7D3EDCAD-2FF9-9B40-90C5-6D68A2560007}" type="datetimeFigureOut">
               <a:rPr lang="en-US" smtClean="0"/>
-              <a:t>3/12/17</a:t>
+              <a:t>7/20/18</a:t>
             </a:fld>
             <a:endParaRPr lang="en-US"/>
           </a:p>
@@ -1924,10 +1908,9 @@
           </a:lstStyle>
           <a:p>
             <a:r>
-              <a:rPr lang="en-US" smtClean="0"/>
+              <a:rPr lang="en-US"/>
               <a:t>Click to edit Master title style</a:t>
             </a:r>
-            <a:endParaRPr lang="en-US"/>
           </a:p>
         </p:txBody>
       </p:sp>
@@ -1981,38 +1964,37 @@
           <a:p>
             <a:pPr lvl="0"/>
             <a:r>
-              <a:rPr lang="en-US" smtClean="0"/>
+              <a:rPr lang="en-US"/>
               <a:t>Click to edit Master text styles</a:t>
             </a:r>
           </a:p>
           <a:p>
             <a:pPr lvl="1"/>
             <a:r>
-              <a:rPr lang="en-US" smtClean="0"/>
+              <a:rPr lang="en-US"/>
               <a:t>Second level</a:t>
             </a:r>
           </a:p>
           <a:p>
             <a:pPr lvl="2"/>
             <a:r>
-              <a:rPr lang="en-US" smtClean="0"/>
+              <a:rPr lang="en-US"/>
               <a:t>Third level</a:t>
             </a:r>
           </a:p>
           <a:p>
             <a:pPr lvl="3"/>
             <a:r>
-              <a:rPr lang="en-US" smtClean="0"/>
+              <a:rPr lang="en-US"/>
               <a:t>Fourth level</a:t>
             </a:r>
           </a:p>
           <a:p>
             <a:pPr lvl="4"/>
             <a:r>
-              <a:rPr lang="en-US" smtClean="0"/>
+              <a:rPr lang="en-US"/>
               <a:t>Fifth level</a:t>
             </a:r>
-            <a:endParaRPr lang="en-US"/>
           </a:p>
         </p:txBody>
       </p:sp>
@@ -2075,7 +2057,7 @@
           <a:p>
             <a:pPr lvl="0"/>
             <a:r>
-              <a:rPr lang="en-US" smtClean="0"/>
+              <a:rPr lang="en-US"/>
               <a:t>Click to edit Master text styles</a:t>
             </a:r>
           </a:p>
@@ -2098,7 +2080,7 @@
           <a:p>
             <a:fld id="{7D3EDCAD-2FF9-9B40-90C5-6D68A2560007}" type="datetimeFigureOut">
               <a:rPr lang="en-US" smtClean="0"/>
-              <a:t>3/12/17</a:t>
+              <a:t>7/20/18</a:t>
             </a:fld>
             <a:endParaRPr lang="en-US"/>
           </a:p>
@@ -2201,10 +2183,9 @@
           </a:lstStyle>
           <a:p>
             <a:r>
-              <a:rPr lang="en-US" smtClean="0"/>
+              <a:rPr lang="en-US"/>
               <a:t>Click to edit Master title style</a:t>
             </a:r>
-            <a:endParaRPr lang="en-US"/>
           </a:p>
         </p:txBody>
       </p:sp>
@@ -2328,7 +2309,7 @@
           <a:p>
             <a:pPr lvl="0"/>
             <a:r>
-              <a:rPr lang="en-US" smtClean="0"/>
+              <a:rPr lang="en-US"/>
               <a:t>Click to edit Master text styles</a:t>
             </a:r>
           </a:p>
@@ -2351,7 +2332,7 @@
           <a:p>
             <a:fld id="{7D3EDCAD-2FF9-9B40-90C5-6D68A2560007}" type="datetimeFigureOut">
               <a:rPr lang="en-US" smtClean="0"/>
-              <a:t>3/12/17</a:t>
+              <a:t>7/20/18</a:t>
             </a:fld>
             <a:endParaRPr lang="en-US"/>
           </a:p>
@@ -2460,10 +2441,9 @@
           <a:lstStyle/>
           <a:p>
             <a:r>
-              <a:rPr lang="en-US" smtClean="0"/>
+              <a:rPr lang="en-US"/>
               <a:t>Click to edit Master title style</a:t>
             </a:r>
-            <a:endParaRPr lang="en-US"/>
           </a:p>
         </p:txBody>
       </p:sp>
@@ -2494,38 +2474,37 @@
           <a:p>
             <a:pPr lvl="0"/>
             <a:r>
-              <a:rPr lang="en-US" smtClean="0"/>
+              <a:rPr lang="en-US"/>
               <a:t>Click to edit Master text styles</a:t>
             </a:r>
           </a:p>
           <a:p>
             <a:pPr lvl="1"/>
             <a:r>
-              <a:rPr lang="en-US" smtClean="0"/>
+              <a:rPr lang="en-US"/>
               <a:t>Second level</a:t>
             </a:r>
           </a:p>
           <a:p>
             <a:pPr lvl="2"/>
             <a:r>
-              <a:rPr lang="en-US" smtClean="0"/>
+              <a:rPr lang="en-US"/>
               <a:t>Third level</a:t>
             </a:r>
           </a:p>
           <a:p>
             <a:pPr lvl="3"/>
             <a:r>
-              <a:rPr lang="en-US" smtClean="0"/>
+              <a:rPr lang="en-US"/>
               <a:t>Fourth level</a:t>
             </a:r>
           </a:p>
           <a:p>
             <a:pPr lvl="4"/>
             <a:r>
-              <a:rPr lang="en-US" smtClean="0"/>
+              <a:rPr lang="en-US"/>
               <a:t>Fifth level</a:t>
             </a:r>
-            <a:endParaRPr lang="en-US"/>
           </a:p>
         </p:txBody>
       </p:sp>
@@ -2564,7 +2543,7 @@
           <a:p>
             <a:fld id="{7D3EDCAD-2FF9-9B40-90C5-6D68A2560007}" type="datetimeFigureOut">
               <a:rPr lang="en-US" smtClean="0"/>
-              <a:t>3/12/17</a:t>
+              <a:t>7/20/18</a:t>
             </a:fld>
             <a:endParaRPr lang="en-US"/>
           </a:p>
@@ -3266,10 +3245,9 @@
             <a:p>
               <a:pPr algn="ctr"/>
               <a:r>
-                <a:rPr lang="en-US" sz="2200" dirty="0" smtClean="0"/>
+                <a:rPr lang="en-US" sz="2200" dirty="0"/>
                 <a:t>Field</a:t>
               </a:r>
-              <a:endParaRPr lang="en-US" sz="2200" dirty="0"/>
             </a:p>
           </p:txBody>
         </p:sp>
@@ -3301,7 +3279,7 @@
             <a:lstStyle/>
             <a:p>
               <a:r>
-                <a:rPr lang="en-US" sz="1100" dirty="0" smtClean="0">
+                <a:rPr lang="en-US" sz="1100" dirty="0">
                   <a:latin typeface="Courier New" charset="0"/>
                   <a:ea typeface="Courier New" charset="0"/>
                   <a:cs typeface="Courier New" charset="0"/>
@@ -3309,35 +3287,35 @@
                 <a:t>Field</a:t>
               </a:r>
               <a:r>
-                <a:rPr lang="en-US" sz="1300" dirty="0" smtClean="0"/>
+                <a:rPr lang="en-US" sz="1300" dirty="0"/>
                 <a:t> objects hold the data of the hydrodynamic fields, stored as 4-dimensional (</a:t>
               </a:r>
               <a:r>
-                <a:rPr lang="en-US" sz="1300" dirty="0" err="1" smtClean="0"/>
+                <a:rPr lang="en-US" sz="1300" dirty="0" err="1"/>
                 <a:t>lon</a:t>
               </a:r>
               <a:r>
-                <a:rPr lang="en-US" sz="1300" dirty="0" smtClean="0"/>
+                <a:rPr lang="en-US" sz="1300" dirty="0"/>
                 <a:t>, </a:t>
               </a:r>
               <a:r>
-                <a:rPr lang="en-US" sz="1300" dirty="0" err="1" smtClean="0"/>
+                <a:rPr lang="en-US" sz="1300" dirty="0" err="1"/>
                 <a:t>lat</a:t>
               </a:r>
               <a:r>
-                <a:rPr lang="en-US" sz="1300" dirty="0" smtClean="0"/>
+                <a:rPr lang="en-US" sz="1300" dirty="0"/>
                 <a:t>, depth, time) </a:t>
               </a:r>
               <a:r>
-                <a:rPr lang="en-US" sz="1300" dirty="0" err="1" smtClean="0"/>
+                <a:rPr lang="en-US" sz="1300" dirty="0" err="1"/>
                 <a:t>numpy</a:t>
               </a:r>
               <a:r>
-                <a:rPr lang="en-US" sz="1300" smtClean="0"/>
+                <a:rPr lang="en-US" sz="1300" dirty="0"/>
                 <a:t> arrays</a:t>
               </a:r>
               <a:r>
-                <a:rPr lang="en-US" sz="1300" smtClean="0">
+                <a:rPr lang="en-US" sz="1300" dirty="0">
                   <a:ea typeface="Courier New" charset="0"/>
                   <a:cs typeface="Courier New" charset="0"/>
                 </a:rPr>
@@ -3399,7 +3377,7 @@
             <a:p>
               <a:pPr algn="ctr"/>
               <a:r>
-                <a:rPr lang="en-US" sz="2200" dirty="0" err="1" smtClean="0"/>
+                <a:rPr lang="en-US" sz="2200" dirty="0" err="1"/>
                 <a:t>FieldSet</a:t>
               </a:r>
               <a:endParaRPr lang="en-US" sz="2200" dirty="0"/>
@@ -3434,7 +3412,7 @@
             <a:lstStyle/>
             <a:p>
               <a:r>
-                <a:rPr lang="en-US" sz="1100" dirty="0" err="1" smtClean="0">
+                <a:rPr lang="en-US" sz="1100" dirty="0" err="1">
                   <a:latin typeface="Courier New" charset="0"/>
                   <a:ea typeface="Courier New" charset="0"/>
                   <a:cs typeface="Courier New" charset="0"/>
@@ -3443,14 +3421,10 @@
               </a:r>
               <a:r>
                 <a:rPr lang="en-US" sz="1300" dirty="0"/>
-                <a:t> objects </a:t>
-              </a:r>
-              <a:r>
-                <a:rPr lang="en-US" sz="1300" dirty="0" smtClean="0"/>
-                <a:t>are collections of </a:t>
-              </a:r>
-              <a:r>
-                <a:rPr lang="en-US" sz="1100" dirty="0" smtClean="0">
+                <a:t> objects are collections of </a:t>
+              </a:r>
+              <a:r>
+                <a:rPr lang="en-US" sz="1100" dirty="0">
                   <a:latin typeface="Courier New" charset="0"/>
                   <a:ea typeface="Courier New" charset="0"/>
                   <a:cs typeface="Courier New" charset="0"/>
@@ -3458,11 +3432,26 @@
                 <a:t>Fields</a:t>
               </a:r>
               <a:r>
-                <a:rPr lang="en-US" sz="1300" dirty="0" smtClean="0"/>
+                <a:rPr lang="en-US" sz="1300" dirty="0">
+                  <a:ea typeface="Courier New" charset="0"/>
+                  <a:cs typeface="Courier New" charset="0"/>
+                </a:rPr>
+                <a:t> or </a:t>
+              </a:r>
+              <a:r>
+                <a:rPr lang="en-US" sz="1100" dirty="0" err="1">
+                  <a:latin typeface="Courier New" charset="0"/>
+                  <a:ea typeface="Courier New" charset="0"/>
+                  <a:cs typeface="Courier New" charset="0"/>
+                </a:rPr>
+                <a:t>FieldLists</a:t>
+              </a:r>
+              <a:r>
+                <a:rPr lang="en-US" sz="1300" dirty="0"/>
                 <a:t>. At least a U and V </a:t>
               </a:r>
               <a:r>
-                <a:rPr lang="en-US" sz="1100" dirty="0" smtClean="0">
+                <a:rPr lang="en-US" sz="1100" dirty="0">
                   <a:latin typeface="Courier New" charset="0"/>
                   <a:ea typeface="Courier New" charset="0"/>
                   <a:cs typeface="Courier New" charset="0"/>
@@ -3470,11 +3459,11 @@
                 <a:t>Field</a:t>
               </a:r>
               <a:r>
-                <a:rPr lang="en-US" sz="1300" dirty="0" smtClean="0"/>
+                <a:rPr lang="en-US" sz="1300" dirty="0"/>
                 <a:t> are required for Parcels to work</a:t>
               </a:r>
               <a:r>
-                <a:rPr lang="en-US" sz="1300" dirty="0" smtClean="0">
+                <a:rPr lang="en-US" sz="1300" dirty="0">
                   <a:ea typeface="Courier New" charset="0"/>
                   <a:cs typeface="Courier New" charset="0"/>
                 </a:rPr>
@@ -3536,10 +3525,9 @@
             <a:p>
               <a:pPr algn="ctr"/>
               <a:r>
-                <a:rPr lang="en-US" sz="2200" dirty="0" smtClean="0"/>
+                <a:rPr lang="en-US" sz="2200" dirty="0"/>
                 <a:t>Particle</a:t>
               </a:r>
-              <a:endParaRPr lang="en-US" sz="2200" dirty="0"/>
             </a:p>
           </p:txBody>
         </p:sp>
@@ -3571,7 +3559,7 @@
             <a:lstStyle/>
             <a:p>
               <a:r>
-                <a:rPr lang="en-US" sz="1100" dirty="0" smtClean="0">
+                <a:rPr lang="en-US" sz="1100" dirty="0">
                   <a:latin typeface="Courier New" charset="0"/>
                   <a:ea typeface="Courier New" charset="0"/>
                   <a:cs typeface="Courier New" charset="0"/>
@@ -3579,11 +3567,11 @@
                 <a:t>Particle</a:t>
               </a:r>
               <a:r>
-                <a:rPr lang="en-US" sz="1300" dirty="0" smtClean="0"/>
+                <a:rPr lang="en-US" sz="1300" dirty="0"/>
                 <a:t> objects contain the position and other variables of each particle in the </a:t>
               </a:r>
               <a:r>
-                <a:rPr lang="en-US" sz="1100" dirty="0" err="1" smtClean="0">
+                <a:rPr lang="en-US" sz="1100" dirty="0" err="1">
                   <a:latin typeface="Courier New" charset="0"/>
                   <a:ea typeface="Courier New" charset="0"/>
                   <a:cs typeface="Courier New" charset="0"/>
@@ -3591,7 +3579,7 @@
                 <a:t>ParticleSet</a:t>
               </a:r>
               <a:r>
-                <a:rPr lang="en-US" sz="1100" dirty="0" smtClean="0">
+                <a:rPr lang="en-US" sz="1100" dirty="0">
                   <a:ea typeface="Courier New" charset="0"/>
                   <a:cs typeface="Courier New" charset="0"/>
                 </a:rPr>
@@ -3657,7 +3645,7 @@
             <a:p>
               <a:pPr algn="ctr"/>
               <a:r>
-                <a:rPr lang="en-US" sz="2200" dirty="0" err="1" smtClean="0"/>
+                <a:rPr lang="en-US" sz="2200" dirty="0" err="1"/>
                 <a:t>ParticleSet</a:t>
               </a:r>
               <a:endParaRPr lang="en-US" sz="2200" dirty="0"/>
@@ -3697,7 +3685,7 @@
             <a:lstStyle/>
             <a:p>
               <a:r>
-                <a:rPr lang="en-US" sz="1100" dirty="0" err="1" smtClean="0">
+                <a:rPr lang="en-US" sz="1100" dirty="0" err="1">
                   <a:latin typeface="Courier New" charset="0"/>
                   <a:ea typeface="Courier New" charset="0"/>
                   <a:cs typeface="Courier New" charset="0"/>
@@ -3705,11 +3693,11 @@
                 <a:t>ParticleSet</a:t>
               </a:r>
               <a:r>
-                <a:rPr lang="en-US" sz="1300" dirty="0" smtClean="0"/>
+                <a:rPr lang="en-US" sz="1300" dirty="0"/>
                 <a:t> objects are the main objects in Parcels. They contain a </a:t>
               </a:r>
               <a:r>
-                <a:rPr lang="en-US" sz="1100" dirty="0" err="1" smtClean="0">
+                <a:rPr lang="en-US" sz="1100" dirty="0" err="1">
                   <a:latin typeface="Courier New" charset="0"/>
                   <a:ea typeface="Courier New" charset="0"/>
                   <a:cs typeface="Courier New" charset="0"/>
@@ -3718,22 +3706,10 @@
               </a:r>
               <a:r>
                 <a:rPr lang="en-US" sz="1300" dirty="0"/>
-                <a:t> and </a:t>
-              </a:r>
-              <a:r>
-                <a:rPr lang="en-US" sz="1300" dirty="0" smtClean="0"/>
-                <a:t>a </a:t>
-              </a:r>
-              <a:r>
-                <a:rPr lang="en-US" sz="1300" dirty="0" smtClean="0"/>
-                <a:t>list </a:t>
-              </a:r>
-              <a:r>
-                <a:rPr lang="en-US" sz="1300" dirty="0" smtClean="0"/>
-                <a:t>of </a:t>
-              </a:r>
-              <a:r>
-                <a:rPr lang="en-US" sz="1100" dirty="0" smtClean="0">
+                <a:t> and a list of </a:t>
+              </a:r>
+              <a:r>
+                <a:rPr lang="en-US" sz="1100" dirty="0">
                   <a:latin typeface="Courier New" charset="0"/>
                   <a:ea typeface="Courier New" charset="0"/>
                   <a:cs typeface="Courier New" charset="0"/>
@@ -3741,18 +3717,17 @@
                 <a:t>Particles</a:t>
               </a:r>
               <a:r>
-                <a:rPr lang="en-US" sz="1300" dirty="0" smtClean="0"/>
+                <a:rPr lang="en-US" sz="1300" dirty="0"/>
                 <a:t>. </a:t>
               </a:r>
-              <a:endParaRPr lang="en-US" sz="1300" dirty="0" smtClean="0"/>
             </a:p>
             <a:p>
               <a:r>
-                <a:rPr lang="en-US" sz="1300" dirty="0" smtClean="0"/>
+                <a:rPr lang="en-US" sz="1300" dirty="0"/>
                 <a:t>The </a:t>
               </a:r>
               <a:r>
-                <a:rPr lang="en-US" sz="1100" dirty="0" smtClean="0">
+                <a:rPr lang="en-US" sz="1100" dirty="0">
                   <a:latin typeface="Courier New" charset="0"/>
                   <a:ea typeface="Courier New" charset="0"/>
                   <a:cs typeface="Courier New" charset="0"/>
@@ -3760,7 +3735,7 @@
                 <a:t>.</a:t>
               </a:r>
               <a:r>
-                <a:rPr lang="en-US" sz="1100" dirty="0" err="1" smtClean="0">
+                <a:rPr lang="en-US" sz="1100" dirty="0" err="1">
                   <a:latin typeface="Courier New" charset="0"/>
                   <a:ea typeface="Courier New" charset="0"/>
                   <a:cs typeface="Courier New" charset="0"/>
@@ -3768,14 +3743,14 @@
                 <a:t>from_list</a:t>
               </a:r>
               <a:r>
-                <a:rPr lang="en-US" sz="1300" dirty="0" smtClean="0">
+                <a:rPr lang="en-US" sz="1300" dirty="0">
                   <a:ea typeface="Courier New" charset="0"/>
                   <a:cs typeface="Courier New" charset="0"/>
                 </a:rPr>
                 <a:t>, </a:t>
               </a:r>
               <a:r>
-                <a:rPr lang="en-US" sz="1100" dirty="0" smtClean="0">
+                <a:rPr lang="en-US" sz="1100" dirty="0">
                   <a:latin typeface="Courier New" charset="0"/>
                   <a:ea typeface="Courier New" charset="0"/>
                   <a:cs typeface="Courier New" charset="0"/>
@@ -3783,18 +3758,18 @@
                 <a:t>.execute</a:t>
               </a:r>
               <a:r>
-                <a:rPr lang="en-US" sz="1300" dirty="0" smtClean="0">
+                <a:rPr lang="en-US" sz="1300" dirty="0">
                   <a:ea typeface="Courier New" charset="0"/>
                   <a:cs typeface="Courier New" charset="0"/>
                 </a:rPr>
                 <a:t> </a:t>
               </a:r>
               <a:r>
-                <a:rPr lang="en-US" sz="1300" dirty="0" smtClean="0"/>
+                <a:rPr lang="en-US" sz="1300" dirty="0"/>
                 <a:t>and </a:t>
               </a:r>
               <a:r>
-                <a:rPr lang="en-US" sz="1100" dirty="0" smtClean="0">
+                <a:rPr lang="en-US" sz="1100" dirty="0">
                   <a:latin typeface="Courier New" charset="0"/>
                   <a:ea typeface="Courier New" charset="0"/>
                   <a:cs typeface="Courier New" charset="0"/>
@@ -3802,26 +3777,18 @@
                 <a:t>.show</a:t>
               </a:r>
               <a:r>
-                <a:rPr lang="en-US" sz="1300" dirty="0" smtClean="0">
+                <a:rPr lang="en-US" sz="1300" dirty="0">
                   <a:ea typeface="Courier New" charset="0"/>
                   <a:cs typeface="Courier New" charset="0"/>
                 </a:rPr>
                 <a:t> </a:t>
               </a:r>
               <a:r>
-                <a:rPr lang="en-US" sz="1300" dirty="0" smtClean="0"/>
-                <a:t>are the </a:t>
-              </a:r>
-              <a:r>
                 <a:rPr lang="en-US" sz="1300" dirty="0"/>
-                <a:t>most important methods defined </a:t>
-              </a:r>
-              <a:r>
-                <a:rPr lang="en-US" sz="1300" dirty="0" smtClean="0"/>
-                <a:t>on </a:t>
-              </a:r>
-              <a:r>
-                <a:rPr lang="en-US" sz="1100" dirty="0" err="1" smtClean="0">
+                <a:t>are the most important methods defined on </a:t>
+              </a:r>
+              <a:r>
+                <a:rPr lang="en-US" sz="1100" dirty="0" err="1">
                   <a:solidFill>
                     <a:srgbClr val="000000"/>
                   </a:solidFill>
@@ -3832,10 +3799,9 @@
                 <a:t>ParticleSets</a:t>
               </a:r>
               <a:r>
-                <a:rPr lang="en-US" sz="1300" dirty="0" smtClean="0"/>
+                <a:rPr lang="en-US" sz="1300" dirty="0"/>
                 <a:t>.</a:t>
               </a:r>
-              <a:endParaRPr lang="en-US" sz="1300" dirty="0"/>
             </a:p>
           </p:txBody>
         </p:sp>
@@ -3891,10 +3857,9 @@
             <a:p>
               <a:pPr algn="ctr"/>
               <a:r>
-                <a:rPr lang="en-US" sz="2200" dirty="0" smtClean="0"/>
+                <a:rPr lang="en-US" sz="2200" dirty="0"/>
                 <a:t>Kernel</a:t>
               </a:r>
-              <a:endParaRPr lang="en-US" sz="2200" dirty="0"/>
             </a:p>
           </p:txBody>
         </p:sp>
@@ -3926,7 +3891,7 @@
             <a:lstStyle/>
             <a:p>
               <a:r>
-                <a:rPr lang="en-US" sz="1100" dirty="0" smtClean="0">
+                <a:rPr lang="en-US" sz="1100" dirty="0">
                   <a:latin typeface="Courier New" charset="0"/>
                   <a:ea typeface="Courier New" charset="0"/>
                   <a:cs typeface="Courier New" charset="0"/>
@@ -3934,11 +3899,11 @@
                 <a:t>Kernels</a:t>
               </a:r>
               <a:r>
-                <a:rPr lang="en-US" sz="1300" dirty="0" smtClean="0"/>
+                <a:rPr lang="en-US" sz="1300" dirty="0"/>
                 <a:t> are little snippets of code that get run when a </a:t>
               </a:r>
               <a:r>
-                <a:rPr lang="en-US" sz="1100" dirty="0" err="1" smtClean="0">
+                <a:rPr lang="en-US" sz="1100" dirty="0" err="1">
                   <a:latin typeface="Courier New" charset="0"/>
                   <a:ea typeface="Courier New" charset="0"/>
                   <a:cs typeface="Courier New" charset="0"/>
@@ -3946,27 +3911,27 @@
                 <a:t>ParticleSet</a:t>
               </a:r>
               <a:r>
-                <a:rPr lang="en-US" sz="1300" dirty="0" smtClean="0"/>
+                <a:rPr lang="en-US" sz="1300" dirty="0"/>
                 <a:t> is executed. Parcels comes with some build-in kernels like 4</a:t>
               </a:r>
               <a:r>
-                <a:rPr lang="en-US" sz="1300" baseline="30000" dirty="0" smtClean="0"/>
+                <a:rPr lang="en-US" sz="1300" baseline="30000" dirty="0"/>
                 <a:t>th</a:t>
               </a:r>
               <a:r>
-                <a:rPr lang="en-US" sz="1300" dirty="0" smtClean="0"/>
+                <a:rPr lang="en-US" sz="1300" dirty="0"/>
                 <a:t> order </a:t>
               </a:r>
               <a:r>
-                <a:rPr lang="en-US" sz="1300" dirty="0" err="1" smtClean="0"/>
+                <a:rPr lang="en-US" sz="1300" dirty="0" err="1"/>
                 <a:t>Runge-Kutta</a:t>
               </a:r>
               <a:r>
-                <a:rPr lang="en-US" sz="1300" dirty="0" smtClean="0"/>
+                <a:rPr lang="en-US" sz="1300" dirty="0"/>
                 <a:t> advection, but it is very easy to create custom kernels. Multiple kernels can be concatenated with the </a:t>
               </a:r>
               <a:r>
-                <a:rPr lang="en-US" sz="1100" dirty="0" smtClean="0">
+                <a:rPr lang="en-US" sz="1100" dirty="0">
                   <a:latin typeface="Courier New" charset="0"/>
                   <a:ea typeface="Courier New" charset="0"/>
                   <a:cs typeface="Courier New" charset="0"/>
@@ -3974,10 +3939,9 @@
                 <a:t>+</a:t>
               </a:r>
               <a:r>
-                <a:rPr lang="en-US" sz="1300" dirty="0" smtClean="0"/>
+                <a:rPr lang="en-US" sz="1300" dirty="0"/>
                 <a:t> operator.</a:t>
               </a:r>
-              <a:endParaRPr lang="en-US" sz="1300" dirty="0"/>
             </a:p>
           </p:txBody>
         </p:sp>
@@ -4036,18 +4000,13 @@
             <a:p>
               <a:pPr algn="ctr"/>
               <a:r>
-                <a:rPr lang="en-US" sz="2200" dirty="0" smtClean="0">
+                <a:rPr lang="en-US" sz="2200" dirty="0">
                   <a:solidFill>
                     <a:schemeClr val="tx1"/>
                   </a:solidFill>
                 </a:rPr>
                 <a:t>.show()</a:t>
               </a:r>
-              <a:endParaRPr lang="en-US" sz="2200" dirty="0">
-                <a:solidFill>
-                  <a:schemeClr val="tx1"/>
-                </a:solidFill>
-              </a:endParaRPr>
             </a:p>
           </p:txBody>
         </p:sp>
@@ -4079,14 +4038,14 @@
             <a:lstStyle/>
             <a:p>
               <a:r>
-                <a:rPr lang="en-US" sz="1100" dirty="0" err="1" smtClean="0">
+                <a:rPr lang="en-US" sz="1100" dirty="0" err="1">
                   <a:latin typeface="Courier New" charset="0"/>
                   <a:ea typeface="Courier New" charset="0"/>
                   <a:cs typeface="Courier New" charset="0"/>
                 </a:rPr>
                 <a:t>ParticleSet.show</a:t>
               </a:r>
-              <a:endParaRPr lang="en-US" sz="1100" dirty="0" smtClean="0">
+              <a:endParaRPr lang="en-US" sz="1100" dirty="0">
                 <a:latin typeface="Courier New" charset="0"/>
                 <a:ea typeface="Courier New" charset="0"/>
                 <a:cs typeface="Courier New" charset="0"/>
@@ -4094,28 +4053,28 @@
             </a:p>
             <a:p>
               <a:r>
-                <a:rPr lang="en-US" sz="1300" dirty="0" smtClean="0">
+                <a:rPr lang="en-US" sz="1300" dirty="0">
                   <a:ea typeface="Courier New" charset="0"/>
                   <a:cs typeface="Courier New" charset="0"/>
                 </a:rPr>
                 <a:t>is the method used to plot particle positions, optionally </a:t>
               </a:r>
               <a:r>
-                <a:rPr lang="en-US" sz="1300" dirty="0" err="1" smtClean="0">
+                <a:rPr lang="en-US" sz="1300" dirty="0" err="1">
                   <a:ea typeface="Courier New" charset="0"/>
                   <a:cs typeface="Courier New" charset="0"/>
                 </a:rPr>
                 <a:t>overlayed</a:t>
               </a:r>
               <a:r>
-                <a:rPr lang="en-US" sz="1300" dirty="0" smtClean="0">
+                <a:rPr lang="en-US" sz="1300" dirty="0">
                   <a:ea typeface="Courier New" charset="0"/>
                   <a:cs typeface="Courier New" charset="0"/>
                 </a:rPr>
                 <a:t> on a </a:t>
               </a:r>
               <a:r>
-                <a:rPr lang="en-US" sz="1100" dirty="0" smtClean="0">
+                <a:rPr lang="en-US" sz="1100" dirty="0">
                   <a:latin typeface="Courier New" charset="0"/>
                   <a:ea typeface="Courier New" charset="0"/>
                   <a:cs typeface="Courier New" charset="0"/>
@@ -4123,7 +4082,7 @@
                 <a:t>Field</a:t>
               </a:r>
               <a:r>
-                <a:rPr lang="en-US" sz="1300" dirty="0" smtClean="0">
+                <a:rPr lang="en-US" sz="1300" dirty="0">
                   <a:ea typeface="Courier New" charset="0"/>
                   <a:cs typeface="Courier New" charset="0"/>
                 </a:rPr>
@@ -4188,18 +4147,13 @@
             <a:p>
               <a:pPr algn="ctr"/>
               <a:r>
-                <a:rPr lang="en-US" sz="2200" dirty="0" smtClean="0">
+                <a:rPr lang="en-US" sz="2200" dirty="0">
                   <a:solidFill>
                     <a:schemeClr val="tx1"/>
                   </a:solidFill>
                 </a:rPr>
                 <a:t>.execute()</a:t>
               </a:r>
-              <a:endParaRPr lang="en-US" sz="2200" dirty="0">
-                <a:solidFill>
-                  <a:schemeClr val="tx1"/>
-                </a:solidFill>
-              </a:endParaRPr>
             </a:p>
           </p:txBody>
         </p:sp>
@@ -4231,14 +4185,14 @@
             <a:lstStyle/>
             <a:p>
               <a:r>
-                <a:rPr lang="en-US" sz="1100" dirty="0" err="1" smtClean="0">
+                <a:rPr lang="en-US" sz="1100" dirty="0" err="1">
                   <a:latin typeface="Courier New" charset="0"/>
                   <a:ea typeface="Courier New" charset="0"/>
                   <a:cs typeface="Courier New" charset="0"/>
                 </a:rPr>
                 <a:t>ParticleSet.execute</a:t>
               </a:r>
-              <a:endParaRPr lang="en-US" sz="1100" dirty="0" smtClean="0">
+              <a:endParaRPr lang="en-US" sz="1100" dirty="0">
                 <a:latin typeface="Courier New" charset="0"/>
                 <a:ea typeface="Courier New" charset="0"/>
                 <a:cs typeface="Courier New" charset="0"/>
@@ -4246,14 +4200,14 @@
             </a:p>
             <a:p>
               <a:r>
-                <a:rPr lang="en-US" sz="1300" dirty="0" smtClean="0">
+                <a:rPr lang="en-US" sz="1300" dirty="0">
                   <a:ea typeface="Courier New" charset="0"/>
                   <a:cs typeface="Courier New" charset="0"/>
                 </a:rPr>
                 <a:t>is the method used to actually compute the evolution of particles by executing </a:t>
               </a:r>
               <a:r>
-                <a:rPr lang="en-US" sz="1100" dirty="0" smtClean="0">
+                <a:rPr lang="en-US" sz="1100" dirty="0">
                   <a:latin typeface="Courier New" charset="0"/>
                   <a:ea typeface="Courier New" charset="0"/>
                   <a:cs typeface="Courier New" charset="0"/>
@@ -4261,7 +4215,7 @@
                 <a:t>Kernel</a:t>
               </a:r>
               <a:r>
-                <a:rPr lang="en-US" sz="1300" dirty="0" smtClean="0">
+                <a:rPr lang="en-US" sz="1300" dirty="0">
                   <a:ea typeface="Courier New" charset="0"/>
                   <a:cs typeface="Courier New" charset="0"/>
                 </a:rPr>
@@ -4296,7 +4250,7 @@
           <a:p>
             <a:pPr algn="r"/>
             <a:r>
-              <a:rPr lang="en-US" sz="2400" b="1" dirty="0" err="1" smtClean="0">
+              <a:rPr lang="en-US" sz="2400" b="1" dirty="0" err="1">
                 <a:latin typeface="+mj-lt"/>
               </a:rPr>
               <a:t>oceanparcels.org</a:t>
@@ -4361,7 +4315,7 @@
             <a:p>
               <a:pPr algn="ctr"/>
               <a:r>
-                <a:rPr lang="en-US" sz="2200" dirty="0" smtClean="0">
+                <a:rPr lang="en-US" sz="2200" dirty="0">
                   <a:solidFill>
                     <a:schemeClr val="tx1"/>
                   </a:solidFill>
@@ -4369,7 +4323,7 @@
                 <a:t>.</a:t>
               </a:r>
               <a:r>
-                <a:rPr lang="en-US" sz="2200" dirty="0" err="1" smtClean="0">
+                <a:rPr lang="en-US" sz="2200" dirty="0" err="1">
                   <a:solidFill>
                     <a:schemeClr val="tx1"/>
                   </a:solidFill>
@@ -4377,18 +4331,13 @@
                 <a:t>from_netcdf</a:t>
               </a:r>
               <a:r>
-                <a:rPr lang="en-US" sz="2200" dirty="0" smtClean="0">
+                <a:rPr lang="en-US" sz="2200" dirty="0">
                   <a:solidFill>
                     <a:schemeClr val="tx1"/>
                   </a:solidFill>
                 </a:rPr>
                 <a:t>()</a:t>
               </a:r>
-              <a:endParaRPr lang="en-US" sz="2200" dirty="0">
-                <a:solidFill>
-                  <a:schemeClr val="tx1"/>
-                </a:solidFill>
-              </a:endParaRPr>
             </a:p>
           </p:txBody>
         </p:sp>
@@ -4420,14 +4369,14 @@
             <a:lstStyle/>
             <a:p>
               <a:r>
-                <a:rPr lang="en-US" sz="1100" dirty="0" err="1" smtClean="0">
+                <a:rPr lang="en-US" sz="1100" dirty="0" err="1">
                   <a:latin typeface="Courier New" charset="0"/>
                   <a:ea typeface="Courier New" charset="0"/>
                   <a:cs typeface="Courier New" charset="0"/>
                 </a:rPr>
                 <a:t>FieldSet.from_netcdf</a:t>
               </a:r>
-              <a:endParaRPr lang="en-US" sz="1100" dirty="0" smtClean="0">
+              <a:endParaRPr lang="en-US" sz="1100" dirty="0">
                 <a:latin typeface="Courier New" charset="0"/>
                 <a:ea typeface="Courier New" charset="0"/>
                 <a:cs typeface="Courier New" charset="0"/>
@@ -4435,28 +4384,28 @@
             </a:p>
             <a:p>
               <a:r>
-                <a:rPr lang="en-US" sz="1300" dirty="0" smtClean="0">
+                <a:rPr lang="en-US" sz="1300" dirty="0">
                   <a:ea typeface="Courier New" charset="0"/>
                   <a:cs typeface="Courier New" charset="0"/>
                 </a:rPr>
                 <a:t>is the method used to read hydrodynamic fields in </a:t>
               </a:r>
               <a:r>
-                <a:rPr lang="en-US" sz="1300" dirty="0" err="1" smtClean="0">
+                <a:rPr lang="en-US" sz="1300" dirty="0" err="1">
                   <a:ea typeface="Courier New" charset="0"/>
                   <a:cs typeface="Courier New" charset="0"/>
                 </a:rPr>
                 <a:t>NetCDF</a:t>
               </a:r>
               <a:r>
-                <a:rPr lang="en-US" sz="1300" dirty="0" smtClean="0">
+                <a:rPr lang="en-US" sz="1300" dirty="0">
                   <a:ea typeface="Courier New" charset="0"/>
                   <a:cs typeface="Courier New" charset="0"/>
                 </a:rPr>
                 <a:t> data using info of </a:t>
               </a:r>
               <a:r>
-                <a:rPr lang="en-US" sz="1100" dirty="0" smtClean="0">
+                <a:rPr lang="en-US" sz="1100" dirty="0">
                   <a:latin typeface="Courier New" charset="0"/>
                   <a:ea typeface="Courier New" charset="0"/>
                   <a:cs typeface="Courier New" charset="0"/>
@@ -4464,7 +4413,7 @@
                 <a:t>Fields</a:t>
               </a:r>
               <a:r>
-                <a:rPr lang="en-US" sz="1300" dirty="0" smtClean="0">
+                <a:rPr lang="en-US" sz="1300" dirty="0">
                   <a:ea typeface="Courier New" charset="0"/>
                   <a:cs typeface="Courier New" charset="0"/>
                 </a:rPr>
@@ -4529,7 +4478,7 @@
             <a:p>
               <a:pPr algn="ctr"/>
               <a:r>
-                <a:rPr lang="en-US" sz="2200" dirty="0" smtClean="0">
+                <a:rPr lang="en-US" sz="2200" dirty="0">
                   <a:solidFill>
                     <a:schemeClr val="tx1"/>
                   </a:solidFill>
@@ -4537,7 +4486,7 @@
                 <a:t>.</a:t>
               </a:r>
               <a:r>
-                <a:rPr lang="en-US" sz="2200" dirty="0" err="1" smtClean="0">
+                <a:rPr lang="en-US" sz="2200" dirty="0" err="1">
                   <a:solidFill>
                     <a:schemeClr val="tx1"/>
                   </a:solidFill>
@@ -4545,18 +4494,13 @@
                 <a:t>from_list</a:t>
               </a:r>
               <a:r>
-                <a:rPr lang="en-US" sz="2200" dirty="0" smtClean="0">
+                <a:rPr lang="en-US" sz="2200" dirty="0">
                   <a:solidFill>
                     <a:schemeClr val="tx1"/>
                   </a:solidFill>
                 </a:rPr>
                 <a:t>()</a:t>
               </a:r>
-              <a:endParaRPr lang="en-US" sz="2200" dirty="0">
-                <a:solidFill>
-                  <a:schemeClr val="tx1"/>
-                </a:solidFill>
-              </a:endParaRPr>
             </a:p>
           </p:txBody>
         </p:sp>
@@ -4588,14 +4532,14 @@
             <a:lstStyle/>
             <a:p>
               <a:r>
-                <a:rPr lang="en-US" sz="1100" dirty="0" err="1" smtClean="0">
+                <a:rPr lang="en-US" sz="1100" dirty="0" err="1">
                   <a:latin typeface="Courier New" charset="0"/>
                   <a:ea typeface="Courier New" charset="0"/>
                   <a:cs typeface="Courier New" charset="0"/>
                 </a:rPr>
                 <a:t>ParticleSet.from_list</a:t>
               </a:r>
-              <a:endParaRPr lang="en-US" sz="1100" dirty="0" smtClean="0">
+              <a:endParaRPr lang="en-US" sz="1100" dirty="0">
                 <a:latin typeface="Courier New" charset="0"/>
                 <a:ea typeface="Courier New" charset="0"/>
                 <a:cs typeface="Courier New" charset="0"/>
@@ -4603,14 +4547,14 @@
             </a:p>
             <a:p>
               <a:r>
-                <a:rPr lang="en-US" sz="1300" dirty="0" smtClean="0">
+                <a:rPr lang="en-US" sz="1300" dirty="0">
                   <a:ea typeface="Courier New" charset="0"/>
                   <a:cs typeface="Courier New" charset="0"/>
                 </a:rPr>
                 <a:t>is one of the methods used to define the starting positions of </a:t>
               </a:r>
               <a:r>
-                <a:rPr lang="en-US" sz="1100" dirty="0" smtClean="0">
+                <a:rPr lang="en-US" sz="1100" dirty="0">
                   <a:latin typeface="Courier New" charset="0"/>
                   <a:ea typeface="Courier New" charset="0"/>
                   <a:cs typeface="Courier New" charset="0"/>
@@ -4618,7 +4562,7 @@
                 <a:t>Particles</a:t>
               </a:r>
               <a:r>
-                <a:rPr lang="en-US" sz="1100" dirty="0" smtClean="0">
+                <a:rPr lang="en-US" sz="1100" dirty="0">
                   <a:ea typeface="Courier New" charset="0"/>
                   <a:cs typeface="Courier New" charset="0"/>
                 </a:rPr>
@@ -4660,13 +4604,7 @@
               <a:rPr lang="en-US" sz="4000" b="1" dirty="0">
                 <a:latin typeface="+mj-lt"/>
               </a:rPr>
-              <a:t>Parcels design </a:t>
-            </a:r>
-            <a:r>
-              <a:rPr lang="en-US" sz="4000" b="1" dirty="0" smtClean="0">
-                <a:latin typeface="+mj-lt"/>
-              </a:rPr>
-              <a:t>overview</a:t>
+              <a:t>Parcels design overview</a:t>
             </a:r>
             <a:endParaRPr lang="en-US" i="1" dirty="0">
               <a:latin typeface="+mj-lt"/>
@@ -4739,47 +4677,20 @@
           <a:p>
             <a:pPr algn="r"/>
             <a:r>
-              <a:rPr lang="en-US" dirty="0" smtClean="0">
-                <a:latin typeface="+mj-lt"/>
-              </a:rPr>
-              <a:t>Classes </a:t>
-            </a:r>
-            <a:r>
               <a:rPr lang="en-US" dirty="0">
                 <a:latin typeface="+mj-lt"/>
               </a:rPr>
-              <a:t>in blue; methods in </a:t>
-            </a:r>
-            <a:r>
-              <a:rPr lang="en-US" dirty="0" smtClean="0">
-                <a:latin typeface="+mj-lt"/>
-              </a:rPr>
-              <a:t>green</a:t>
+              <a:t>Classes in blue; methods in green</a:t>
             </a:r>
           </a:p>
           <a:p>
             <a:pPr algn="r"/>
-            <a:r>
-              <a:rPr lang="en-US" i="1" dirty="0" smtClean="0">
-                <a:latin typeface="+mj-lt"/>
-              </a:rPr>
-              <a:t>Not all methods </a:t>
-            </a:r>
             <a:r>
               <a:rPr lang="en-US" i="1" dirty="0">
                 <a:latin typeface="+mj-lt"/>
               </a:rPr>
-              <a:t>and classes are </a:t>
-            </a:r>
-            <a:r>
-              <a:rPr lang="en-US" i="1" dirty="0" smtClean="0">
-                <a:latin typeface="+mj-lt"/>
-              </a:rPr>
-              <a:t>shown</a:t>
-            </a:r>
-            <a:endParaRPr lang="en-US" i="1" dirty="0">
-              <a:latin typeface="+mj-lt"/>
-            </a:endParaRPr>
+              <a:t>Not all methods and classes are shown</a:t>
+            </a:r>
           </a:p>
         </p:txBody>
       </p:sp>

</xml_diff>

<commit_message>
Adding from_xarray() to parcels design figures
</commit_message>
<xml_diff>
--- a/images/parcelsdesign.pptx
+++ b/images/parcelsdesign.pptx
@@ -4,6 +4,9 @@
   <p:sldMasterIdLst>
     <p:sldMasterId id="2147483648" r:id="rId1"/>
   </p:sldMasterIdLst>
+  <p:notesMasterIdLst>
+    <p:notesMasterId r:id="rId3"/>
+  </p:notesMasterIdLst>
   <p:sldIdLst>
     <p:sldId id="256" r:id="rId2"/>
   </p:sldIdLst>
@@ -112,6 +115,440 @@
 </p:presentation>
 </file>
 
+<file path=ppt/notesMasters/notesMaster1.xml><?xml version="1.0" encoding="utf-8"?>
+<p:notesMaster xmlns:a="http://schemas.openxmlformats.org/drawingml/2006/main" xmlns:r="http://schemas.openxmlformats.org/officeDocument/2006/relationships" xmlns:p="http://schemas.openxmlformats.org/presentationml/2006/main">
+  <p:cSld>
+    <p:bg>
+      <p:bgRef idx="1001">
+        <a:schemeClr val="bg1"/>
+      </p:bgRef>
+    </p:bg>
+    <p:spTree>
+      <p:nvGrpSpPr>
+        <p:cNvPr id="1" name=""/>
+        <p:cNvGrpSpPr/>
+        <p:nvPr/>
+      </p:nvGrpSpPr>
+      <p:grpSpPr>
+        <a:xfrm>
+          <a:off x="0" y="0"/>
+          <a:ext cx="0" cy="0"/>
+          <a:chOff x="0" y="0"/>
+          <a:chExt cx="0" cy="0"/>
+        </a:xfrm>
+      </p:grpSpPr>
+      <p:sp>
+        <p:nvSpPr>
+          <p:cNvPr id="2" name="Header Placeholder 1"/>
+          <p:cNvSpPr>
+            <a:spLocks noGrp="1"/>
+          </p:cNvSpPr>
+          <p:nvPr>
+            <p:ph type="hdr" sz="quarter"/>
+          </p:nvPr>
+        </p:nvSpPr>
+        <p:spPr>
+          <a:xfrm>
+            <a:off x="0" y="0"/>
+            <a:ext cx="2971800" cy="458788"/>
+          </a:xfrm>
+          <a:prstGeom prst="rect">
+            <a:avLst/>
+          </a:prstGeom>
+        </p:spPr>
+        <p:txBody>
+          <a:bodyPr vert="horz" lIns="91440" tIns="45720" rIns="91440" bIns="45720" rtlCol="0"/>
+          <a:lstStyle>
+            <a:lvl1pPr algn="l">
+              <a:defRPr sz="1200"/>
+            </a:lvl1pPr>
+          </a:lstStyle>
+          <a:p>
+            <a:endParaRPr lang="en-US"/>
+          </a:p>
+        </p:txBody>
+      </p:sp>
+      <p:sp>
+        <p:nvSpPr>
+          <p:cNvPr id="3" name="Date Placeholder 2"/>
+          <p:cNvSpPr>
+            <a:spLocks noGrp="1"/>
+          </p:cNvSpPr>
+          <p:nvPr>
+            <p:ph type="dt" idx="1"/>
+          </p:nvPr>
+        </p:nvSpPr>
+        <p:spPr>
+          <a:xfrm>
+            <a:off x="3884613" y="0"/>
+            <a:ext cx="2971800" cy="458788"/>
+          </a:xfrm>
+          <a:prstGeom prst="rect">
+            <a:avLst/>
+          </a:prstGeom>
+        </p:spPr>
+        <p:txBody>
+          <a:bodyPr vert="horz" lIns="91440" tIns="45720" rIns="91440" bIns="45720" rtlCol="0"/>
+          <a:lstStyle>
+            <a:lvl1pPr algn="r">
+              <a:defRPr sz="1200"/>
+            </a:lvl1pPr>
+          </a:lstStyle>
+          <a:p>
+            <a:fld id="{76BA1978-A596-F141-97E6-8C4865C5F65E}" type="datetimeFigureOut">
+              <a:rPr lang="en-US" smtClean="0"/>
+              <a:t>2/7/20</a:t>
+            </a:fld>
+            <a:endParaRPr lang="en-US"/>
+          </a:p>
+        </p:txBody>
+      </p:sp>
+      <p:sp>
+        <p:nvSpPr>
+          <p:cNvPr id="4" name="Slide Image Placeholder 3"/>
+          <p:cNvSpPr>
+            <a:spLocks noGrp="1" noRot="1" noChangeAspect="1"/>
+          </p:cNvSpPr>
+          <p:nvPr>
+            <p:ph type="sldImg" idx="2"/>
+          </p:nvPr>
+        </p:nvSpPr>
+        <p:spPr>
+          <a:xfrm>
+            <a:off x="685800" y="1143000"/>
+            <a:ext cx="5486400" cy="3086100"/>
+          </a:xfrm>
+          <a:prstGeom prst="rect">
+            <a:avLst/>
+          </a:prstGeom>
+          <a:noFill/>
+          <a:ln w="12700">
+            <a:solidFill>
+              <a:prstClr val="black"/>
+            </a:solidFill>
+          </a:ln>
+        </p:spPr>
+        <p:txBody>
+          <a:bodyPr vert="horz" lIns="91440" tIns="45720" rIns="91440" bIns="45720" rtlCol="0" anchor="ctr"/>
+          <a:lstStyle/>
+          <a:p>
+            <a:endParaRPr lang="en-US"/>
+          </a:p>
+        </p:txBody>
+      </p:sp>
+      <p:sp>
+        <p:nvSpPr>
+          <p:cNvPr id="5" name="Notes Placeholder 4"/>
+          <p:cNvSpPr>
+            <a:spLocks noGrp="1"/>
+          </p:cNvSpPr>
+          <p:nvPr>
+            <p:ph type="body" sz="quarter" idx="3"/>
+          </p:nvPr>
+        </p:nvSpPr>
+        <p:spPr>
+          <a:xfrm>
+            <a:off x="685800" y="4400550"/>
+            <a:ext cx="5486400" cy="3600450"/>
+          </a:xfrm>
+          <a:prstGeom prst="rect">
+            <a:avLst/>
+          </a:prstGeom>
+        </p:spPr>
+        <p:txBody>
+          <a:bodyPr vert="horz" lIns="91440" tIns="45720" rIns="91440" bIns="45720" rtlCol="0"/>
+          <a:lstStyle/>
+          <a:p>
+            <a:pPr lvl="0"/>
+            <a:r>
+              <a:rPr lang="en-GB"/>
+              <a:t>Click to edit Master text styles</a:t>
+            </a:r>
+          </a:p>
+          <a:p>
+            <a:pPr lvl="1"/>
+            <a:r>
+              <a:rPr lang="en-GB"/>
+              <a:t>Second level</a:t>
+            </a:r>
+          </a:p>
+          <a:p>
+            <a:pPr lvl="2"/>
+            <a:r>
+              <a:rPr lang="en-GB"/>
+              <a:t>Third level</a:t>
+            </a:r>
+          </a:p>
+          <a:p>
+            <a:pPr lvl="3"/>
+            <a:r>
+              <a:rPr lang="en-GB"/>
+              <a:t>Fourth level</a:t>
+            </a:r>
+          </a:p>
+          <a:p>
+            <a:pPr lvl="4"/>
+            <a:r>
+              <a:rPr lang="en-GB"/>
+              <a:t>Fifth level</a:t>
+            </a:r>
+            <a:endParaRPr lang="en-US"/>
+          </a:p>
+        </p:txBody>
+      </p:sp>
+      <p:sp>
+        <p:nvSpPr>
+          <p:cNvPr id="6" name="Footer Placeholder 5"/>
+          <p:cNvSpPr>
+            <a:spLocks noGrp="1"/>
+          </p:cNvSpPr>
+          <p:nvPr>
+            <p:ph type="ftr" sz="quarter" idx="4"/>
+          </p:nvPr>
+        </p:nvSpPr>
+        <p:spPr>
+          <a:xfrm>
+            <a:off x="0" y="8685213"/>
+            <a:ext cx="2971800" cy="458787"/>
+          </a:xfrm>
+          <a:prstGeom prst="rect">
+            <a:avLst/>
+          </a:prstGeom>
+        </p:spPr>
+        <p:txBody>
+          <a:bodyPr vert="horz" lIns="91440" tIns="45720" rIns="91440" bIns="45720" rtlCol="0" anchor="b"/>
+          <a:lstStyle>
+            <a:lvl1pPr algn="l">
+              <a:defRPr sz="1200"/>
+            </a:lvl1pPr>
+          </a:lstStyle>
+          <a:p>
+            <a:endParaRPr lang="en-US"/>
+          </a:p>
+        </p:txBody>
+      </p:sp>
+      <p:sp>
+        <p:nvSpPr>
+          <p:cNvPr id="7" name="Slide Number Placeholder 6"/>
+          <p:cNvSpPr>
+            <a:spLocks noGrp="1"/>
+          </p:cNvSpPr>
+          <p:nvPr>
+            <p:ph type="sldNum" sz="quarter" idx="5"/>
+          </p:nvPr>
+        </p:nvSpPr>
+        <p:spPr>
+          <a:xfrm>
+            <a:off x="3884613" y="8685213"/>
+            <a:ext cx="2971800" cy="458787"/>
+          </a:xfrm>
+          <a:prstGeom prst="rect">
+            <a:avLst/>
+          </a:prstGeom>
+        </p:spPr>
+        <p:txBody>
+          <a:bodyPr vert="horz" lIns="91440" tIns="45720" rIns="91440" bIns="45720" rtlCol="0" anchor="b"/>
+          <a:lstStyle>
+            <a:lvl1pPr algn="r">
+              <a:defRPr sz="1200"/>
+            </a:lvl1pPr>
+          </a:lstStyle>
+          <a:p>
+            <a:fld id="{9040F0E6-475D-F64B-B268-B4A95DCBB015}" type="slidenum">
+              <a:rPr lang="en-US" smtClean="0"/>
+              <a:t>‹#›</a:t>
+            </a:fld>
+            <a:endParaRPr lang="en-US"/>
+          </a:p>
+        </p:txBody>
+      </p:sp>
+    </p:spTree>
+    <p:extLst>
+      <p:ext uri="{BB962C8B-B14F-4D97-AF65-F5344CB8AC3E}">
+        <p14:creationId xmlns:p14="http://schemas.microsoft.com/office/powerpoint/2010/main" val="3624345388"/>
+      </p:ext>
+    </p:extLst>
+  </p:cSld>
+  <p:clrMap bg1="lt1" tx1="dk1" bg2="lt2" tx2="dk2" accent1="accent1" accent2="accent2" accent3="accent3" accent4="accent4" accent5="accent5" accent6="accent6" hlink="hlink" folHlink="folHlink"/>
+  <p:notesStyle>
+    <a:lvl1pPr marL="0" algn="l" defTabSz="914400" rtl="0" eaLnBrk="1" latinLnBrk="0" hangingPunct="1">
+      <a:defRPr sz="1200" kern="1200">
+        <a:solidFill>
+          <a:schemeClr val="tx1"/>
+        </a:solidFill>
+        <a:latin typeface="+mn-lt"/>
+        <a:ea typeface="+mn-ea"/>
+        <a:cs typeface="+mn-cs"/>
+      </a:defRPr>
+    </a:lvl1pPr>
+    <a:lvl2pPr marL="457200" algn="l" defTabSz="914400" rtl="0" eaLnBrk="1" latinLnBrk="0" hangingPunct="1">
+      <a:defRPr sz="1200" kern="1200">
+        <a:solidFill>
+          <a:schemeClr val="tx1"/>
+        </a:solidFill>
+        <a:latin typeface="+mn-lt"/>
+        <a:ea typeface="+mn-ea"/>
+        <a:cs typeface="+mn-cs"/>
+      </a:defRPr>
+    </a:lvl2pPr>
+    <a:lvl3pPr marL="914400" algn="l" defTabSz="914400" rtl="0" eaLnBrk="1" latinLnBrk="0" hangingPunct="1">
+      <a:defRPr sz="1200" kern="1200">
+        <a:solidFill>
+          <a:schemeClr val="tx1"/>
+        </a:solidFill>
+        <a:latin typeface="+mn-lt"/>
+        <a:ea typeface="+mn-ea"/>
+        <a:cs typeface="+mn-cs"/>
+      </a:defRPr>
+    </a:lvl3pPr>
+    <a:lvl4pPr marL="1371600" algn="l" defTabSz="914400" rtl="0" eaLnBrk="1" latinLnBrk="0" hangingPunct="1">
+      <a:defRPr sz="1200" kern="1200">
+        <a:solidFill>
+          <a:schemeClr val="tx1"/>
+        </a:solidFill>
+        <a:latin typeface="+mn-lt"/>
+        <a:ea typeface="+mn-ea"/>
+        <a:cs typeface="+mn-cs"/>
+      </a:defRPr>
+    </a:lvl4pPr>
+    <a:lvl5pPr marL="1828800" algn="l" defTabSz="914400" rtl="0" eaLnBrk="1" latinLnBrk="0" hangingPunct="1">
+      <a:defRPr sz="1200" kern="1200">
+        <a:solidFill>
+          <a:schemeClr val="tx1"/>
+        </a:solidFill>
+        <a:latin typeface="+mn-lt"/>
+        <a:ea typeface="+mn-ea"/>
+        <a:cs typeface="+mn-cs"/>
+      </a:defRPr>
+    </a:lvl5pPr>
+    <a:lvl6pPr marL="2286000" algn="l" defTabSz="914400" rtl="0" eaLnBrk="1" latinLnBrk="0" hangingPunct="1">
+      <a:defRPr sz="1200" kern="1200">
+        <a:solidFill>
+          <a:schemeClr val="tx1"/>
+        </a:solidFill>
+        <a:latin typeface="+mn-lt"/>
+        <a:ea typeface="+mn-ea"/>
+        <a:cs typeface="+mn-cs"/>
+      </a:defRPr>
+    </a:lvl6pPr>
+    <a:lvl7pPr marL="2743200" algn="l" defTabSz="914400" rtl="0" eaLnBrk="1" latinLnBrk="0" hangingPunct="1">
+      <a:defRPr sz="1200" kern="1200">
+        <a:solidFill>
+          <a:schemeClr val="tx1"/>
+        </a:solidFill>
+        <a:latin typeface="+mn-lt"/>
+        <a:ea typeface="+mn-ea"/>
+        <a:cs typeface="+mn-cs"/>
+      </a:defRPr>
+    </a:lvl7pPr>
+    <a:lvl8pPr marL="3200400" algn="l" defTabSz="914400" rtl="0" eaLnBrk="1" latinLnBrk="0" hangingPunct="1">
+      <a:defRPr sz="1200" kern="1200">
+        <a:solidFill>
+          <a:schemeClr val="tx1"/>
+        </a:solidFill>
+        <a:latin typeface="+mn-lt"/>
+        <a:ea typeface="+mn-ea"/>
+        <a:cs typeface="+mn-cs"/>
+      </a:defRPr>
+    </a:lvl8pPr>
+    <a:lvl9pPr marL="3657600" algn="l" defTabSz="914400" rtl="0" eaLnBrk="1" latinLnBrk="0" hangingPunct="1">
+      <a:defRPr sz="1200" kern="1200">
+        <a:solidFill>
+          <a:schemeClr val="tx1"/>
+        </a:solidFill>
+        <a:latin typeface="+mn-lt"/>
+        <a:ea typeface="+mn-ea"/>
+        <a:cs typeface="+mn-cs"/>
+      </a:defRPr>
+    </a:lvl9pPr>
+  </p:notesStyle>
+</p:notesMaster>
+</file>
+
+<file path=ppt/notesSlides/notesSlide1.xml><?xml version="1.0" encoding="utf-8"?>
+<p:notes xmlns:a="http://schemas.openxmlformats.org/drawingml/2006/main" xmlns:r="http://schemas.openxmlformats.org/officeDocument/2006/relationships" xmlns:p="http://schemas.openxmlformats.org/presentationml/2006/main">
+  <p:cSld>
+    <p:spTree>
+      <p:nvGrpSpPr>
+        <p:cNvPr id="1" name=""/>
+        <p:cNvGrpSpPr/>
+        <p:nvPr/>
+      </p:nvGrpSpPr>
+      <p:grpSpPr>
+        <a:xfrm>
+          <a:off x="0" y="0"/>
+          <a:ext cx="0" cy="0"/>
+          <a:chOff x="0" y="0"/>
+          <a:chExt cx="0" cy="0"/>
+        </a:xfrm>
+      </p:grpSpPr>
+      <p:sp>
+        <p:nvSpPr>
+          <p:cNvPr id="2" name="Slide Image Placeholder 1"/>
+          <p:cNvSpPr>
+            <a:spLocks noGrp="1" noRot="1" noChangeAspect="1"/>
+          </p:cNvSpPr>
+          <p:nvPr>
+            <p:ph type="sldImg"/>
+          </p:nvPr>
+        </p:nvSpPr>
+        <p:spPr/>
+      </p:sp>
+      <p:sp>
+        <p:nvSpPr>
+          <p:cNvPr id="3" name="Notes Placeholder 2"/>
+          <p:cNvSpPr>
+            <a:spLocks noGrp="1"/>
+          </p:cNvSpPr>
+          <p:nvPr>
+            <p:ph type="body" idx="1"/>
+          </p:nvPr>
+        </p:nvSpPr>
+        <p:spPr/>
+        <p:txBody>
+          <a:bodyPr/>
+          <a:lstStyle/>
+          <a:p>
+            <a:endParaRPr lang="en-US" dirty="0"/>
+          </a:p>
+        </p:txBody>
+      </p:sp>
+      <p:sp>
+        <p:nvSpPr>
+          <p:cNvPr id="4" name="Slide Number Placeholder 3"/>
+          <p:cNvSpPr>
+            <a:spLocks noGrp="1"/>
+          </p:cNvSpPr>
+          <p:nvPr>
+            <p:ph type="sldNum" sz="quarter" idx="5"/>
+          </p:nvPr>
+        </p:nvSpPr>
+        <p:spPr/>
+        <p:txBody>
+          <a:bodyPr/>
+          <a:lstStyle/>
+          <a:p>
+            <a:fld id="{9040F0E6-475D-F64B-B268-B4A95DCBB015}" type="slidenum">
+              <a:rPr lang="en-US" smtClean="0"/>
+              <a:t>1</a:t>
+            </a:fld>
+            <a:endParaRPr lang="en-US"/>
+          </a:p>
+        </p:txBody>
+      </p:sp>
+    </p:spTree>
+    <p:extLst>
+      <p:ext uri="{BB962C8B-B14F-4D97-AF65-F5344CB8AC3E}">
+        <p14:creationId xmlns:p14="http://schemas.microsoft.com/office/powerpoint/2010/main" val="1820080947"/>
+      </p:ext>
+    </p:extLst>
+  </p:cSld>
+  <p:clrMapOvr>
+    <a:masterClrMapping/>
+  </p:clrMapOvr>
+</p:notes>
+</file>
+
 <file path=ppt/slideLayouts/slideLayout1.xml><?xml version="1.0" encoding="utf-8"?>
 <p:sldLayout xmlns:a="http://schemas.openxmlformats.org/drawingml/2006/main" xmlns:r="http://schemas.openxmlformats.org/officeDocument/2006/relationships" xmlns:p="http://schemas.openxmlformats.org/presentationml/2006/main" type="title" preserve="1">
   <p:cSld name="Title Slide">
@@ -241,7 +678,7 @@
           <a:p>
             <a:fld id="{7D3EDCAD-2FF9-9B40-90C5-6D68A2560007}" type="datetimeFigureOut">
               <a:rPr lang="en-US" smtClean="0"/>
-              <a:t>7/20/18</a:t>
+              <a:t>2/7/20</a:t>
             </a:fld>
             <a:endParaRPr lang="en-US"/>
           </a:p>
@@ -409,7 +846,7 @@
           <a:p>
             <a:fld id="{7D3EDCAD-2FF9-9B40-90C5-6D68A2560007}" type="datetimeFigureOut">
               <a:rPr lang="en-US" smtClean="0"/>
-              <a:t>7/20/18</a:t>
+              <a:t>2/7/20</a:t>
             </a:fld>
             <a:endParaRPr lang="en-US"/>
           </a:p>
@@ -587,7 +1024,7 @@
           <a:p>
             <a:fld id="{7D3EDCAD-2FF9-9B40-90C5-6D68A2560007}" type="datetimeFigureOut">
               <a:rPr lang="en-US" smtClean="0"/>
-              <a:t>7/20/18</a:t>
+              <a:t>2/7/20</a:t>
             </a:fld>
             <a:endParaRPr lang="en-US"/>
           </a:p>
@@ -755,7 +1192,7 @@
           <a:p>
             <a:fld id="{7D3EDCAD-2FF9-9B40-90C5-6D68A2560007}" type="datetimeFigureOut">
               <a:rPr lang="en-US" smtClean="0"/>
-              <a:t>7/20/18</a:t>
+              <a:t>2/7/20</a:t>
             </a:fld>
             <a:endParaRPr lang="en-US"/>
           </a:p>
@@ -1000,7 +1437,7 @@
           <a:p>
             <a:fld id="{7D3EDCAD-2FF9-9B40-90C5-6D68A2560007}" type="datetimeFigureOut">
               <a:rPr lang="en-US" smtClean="0"/>
-              <a:t>7/20/18</a:t>
+              <a:t>2/7/20</a:t>
             </a:fld>
             <a:endParaRPr lang="en-US"/>
           </a:p>
@@ -1229,7 +1666,7 @@
           <a:p>
             <a:fld id="{7D3EDCAD-2FF9-9B40-90C5-6D68A2560007}" type="datetimeFigureOut">
               <a:rPr lang="en-US" smtClean="0"/>
-              <a:t>7/20/18</a:t>
+              <a:t>2/7/20</a:t>
             </a:fld>
             <a:endParaRPr lang="en-US"/>
           </a:p>
@@ -1593,7 +2030,7 @@
           <a:p>
             <a:fld id="{7D3EDCAD-2FF9-9B40-90C5-6D68A2560007}" type="datetimeFigureOut">
               <a:rPr lang="en-US" smtClean="0"/>
-              <a:t>7/20/18</a:t>
+              <a:t>2/7/20</a:t>
             </a:fld>
             <a:endParaRPr lang="en-US"/>
           </a:p>
@@ -1710,7 +2147,7 @@
           <a:p>
             <a:fld id="{7D3EDCAD-2FF9-9B40-90C5-6D68A2560007}" type="datetimeFigureOut">
               <a:rPr lang="en-US" smtClean="0"/>
-              <a:t>7/20/18</a:t>
+              <a:t>2/7/20</a:t>
             </a:fld>
             <a:endParaRPr lang="en-US"/>
           </a:p>
@@ -1805,7 +2242,7 @@
           <a:p>
             <a:fld id="{7D3EDCAD-2FF9-9B40-90C5-6D68A2560007}" type="datetimeFigureOut">
               <a:rPr lang="en-US" smtClean="0"/>
-              <a:t>7/20/18</a:t>
+              <a:t>2/7/20</a:t>
             </a:fld>
             <a:endParaRPr lang="en-US"/>
           </a:p>
@@ -2080,7 +2517,7 @@
           <a:p>
             <a:fld id="{7D3EDCAD-2FF9-9B40-90C5-6D68A2560007}" type="datetimeFigureOut">
               <a:rPr lang="en-US" smtClean="0"/>
-              <a:t>7/20/18</a:t>
+              <a:t>2/7/20</a:t>
             </a:fld>
             <a:endParaRPr lang="en-US"/>
           </a:p>
@@ -2332,7 +2769,7 @@
           <a:p>
             <a:fld id="{7D3EDCAD-2FF9-9B40-90C5-6D68A2560007}" type="datetimeFigureOut">
               <a:rPr lang="en-US" smtClean="0"/>
-              <a:t>7/20/18</a:t>
+              <a:t>2/7/20</a:t>
             </a:fld>
             <a:endParaRPr lang="en-US"/>
           </a:p>
@@ -2543,7 +2980,7 @@
           <a:p>
             <a:fld id="{7D3EDCAD-2FF9-9B40-90C5-6D68A2560007}" type="datetimeFigureOut">
               <a:rPr lang="en-US" smtClean="0"/>
-              <a:t>7/20/18</a:t>
+              <a:t>2/7/20</a:t>
             </a:fld>
             <a:endParaRPr lang="en-US"/>
           </a:p>
@@ -3041,8 +3478,8 @@
         </p:nvCxnSpPr>
         <p:spPr>
           <a:xfrm>
-            <a:off x="2016275" y="2305115"/>
-            <a:ext cx="539726" cy="2402846"/>
+            <a:off x="2023959" y="1477394"/>
+            <a:ext cx="532042" cy="3230567"/>
           </a:xfrm>
           <a:prstGeom prst="bentConnector3">
             <a:avLst>
@@ -3202,7 +3639,7 @@
         </p:nvGrpSpPr>
         <p:grpSpPr>
           <a:xfrm>
-            <a:off x="49745" y="2079847"/>
+            <a:off x="57429" y="1252126"/>
             <a:ext cx="1966531" cy="1795825"/>
             <a:chOff x="404810" y="4111380"/>
             <a:chExt cx="1966531" cy="1795825"/>
@@ -3305,6 +3742,14 @@
               <a:r>
                 <a:rPr lang="en-US" sz="1300" dirty="0"/>
                 <a:t>, depth, time) </a:t>
+              </a:r>
+              <a:r>
+                <a:rPr lang="en-US" sz="1300" dirty="0" err="1"/>
+                <a:t>dask</a:t>
+              </a:r>
+              <a:r>
+                <a:rPr lang="en-US" sz="1300" dirty="0"/>
+                <a:t> or </a:t>
               </a:r>
               <a:r>
                 <a:rPr lang="en-US" sz="1300" dirty="0" err="1"/>
@@ -4269,7 +4714,7 @@
         </p:nvGrpSpPr>
         <p:grpSpPr>
           <a:xfrm>
-            <a:off x="49745" y="4518666"/>
+            <a:off x="53587" y="3311681"/>
             <a:ext cx="1974214" cy="1566740"/>
             <a:chOff x="7798823" y="2548319"/>
             <a:chExt cx="1974214" cy="1566740"/>
@@ -4704,12 +5149,227 @@
           <p:nvPr/>
         </p:nvCxnSpPr>
         <p:spPr>
-          <a:xfrm flipV="1">
-            <a:off x="2016275" y="4707961"/>
-            <a:ext cx="539726" cy="35973"/>
+          <a:xfrm>
+            <a:off x="2020117" y="3536949"/>
+            <a:ext cx="535884" cy="1171012"/>
           </a:xfrm>
           <a:prstGeom prst="bentConnector3">
             <a:avLst/>
+          </a:prstGeom>
+          <a:ln>
+            <a:solidFill>
+              <a:schemeClr val="accent2"/>
+            </a:solidFill>
+            <a:tailEnd type="triangle"/>
+          </a:ln>
+        </p:spPr>
+        <p:style>
+          <a:lnRef idx="1">
+            <a:schemeClr val="accent1"/>
+          </a:lnRef>
+          <a:fillRef idx="0">
+            <a:schemeClr val="accent1"/>
+          </a:fillRef>
+          <a:effectRef idx="0">
+            <a:schemeClr val="accent1"/>
+          </a:effectRef>
+          <a:fontRef idx="minor">
+            <a:schemeClr val="tx1"/>
+          </a:fontRef>
+        </p:style>
+      </p:cxnSp>
+      <p:grpSp>
+        <p:nvGrpSpPr>
+          <p:cNvPr id="40" name="Group 39">
+            <a:extLst>
+              <a:ext uri="{FF2B5EF4-FFF2-40B4-BE49-F238E27FC236}">
+                <a16:creationId xmlns:a16="http://schemas.microsoft.com/office/drawing/2014/main" id="{F8E65DDA-0530-9F4B-A640-6CF81B05767F}"/>
+              </a:ext>
+            </a:extLst>
+          </p:cNvPr>
+          <p:cNvGrpSpPr/>
+          <p:nvPr/>
+        </p:nvGrpSpPr>
+        <p:grpSpPr>
+          <a:xfrm>
+            <a:off x="80920" y="5104415"/>
+            <a:ext cx="1974214" cy="1166631"/>
+            <a:chOff x="7798823" y="2548319"/>
+            <a:chExt cx="1974214" cy="1166631"/>
+          </a:xfrm>
+        </p:grpSpPr>
+        <p:sp>
+          <p:nvSpPr>
+            <p:cNvPr id="41" name="Folded Corner 40">
+              <a:extLst>
+                <a:ext uri="{FF2B5EF4-FFF2-40B4-BE49-F238E27FC236}">
+                  <a16:creationId xmlns:a16="http://schemas.microsoft.com/office/drawing/2014/main" id="{F6F79834-7580-0F43-8DA7-6F8D7DA767CF}"/>
+                </a:ext>
+              </a:extLst>
+            </p:cNvPr>
+            <p:cNvSpPr/>
+            <p:nvPr/>
+          </p:nvSpPr>
+          <p:spPr>
+            <a:xfrm>
+              <a:off x="7798823" y="2548319"/>
+              <a:ext cx="1966530" cy="450535"/>
+            </a:xfrm>
+            <a:prstGeom prst="foldedCorner">
+              <a:avLst/>
+            </a:prstGeom>
+            <a:solidFill>
+              <a:srgbClr val="92D050"/>
+            </a:solidFill>
+          </p:spPr>
+          <p:style>
+            <a:lnRef idx="2">
+              <a:schemeClr val="accent1">
+                <a:shade val="50000"/>
+              </a:schemeClr>
+            </a:lnRef>
+            <a:fillRef idx="1">
+              <a:schemeClr val="accent1"/>
+            </a:fillRef>
+            <a:effectRef idx="0">
+              <a:schemeClr val="accent1"/>
+            </a:effectRef>
+            <a:fontRef idx="minor">
+              <a:schemeClr val="lt1"/>
+            </a:fontRef>
+          </p:style>
+          <p:txBody>
+            <a:bodyPr rtlCol="0" anchor="ctr"/>
+            <a:lstStyle/>
+            <a:p>
+              <a:pPr algn="ctr"/>
+              <a:r>
+                <a:rPr lang="en-US" sz="2200" dirty="0">
+                  <a:solidFill>
+                    <a:schemeClr val="tx1"/>
+                  </a:solidFill>
+                </a:rPr>
+                <a:t>.</a:t>
+              </a:r>
+              <a:r>
+                <a:rPr lang="en-US" sz="2200" dirty="0" err="1">
+                  <a:solidFill>
+                    <a:schemeClr val="tx1"/>
+                  </a:solidFill>
+                </a:rPr>
+                <a:t>from_xarray</a:t>
+              </a:r>
+              <a:r>
+                <a:rPr lang="en-US" sz="2200" dirty="0">
+                  <a:solidFill>
+                    <a:schemeClr val="tx1"/>
+                  </a:solidFill>
+                </a:rPr>
+                <a:t>()</a:t>
+              </a:r>
+            </a:p>
+          </p:txBody>
+        </p:sp>
+        <p:sp>
+          <p:nvSpPr>
+            <p:cNvPr id="42" name="TextBox 41">
+              <a:extLst>
+                <a:ext uri="{FF2B5EF4-FFF2-40B4-BE49-F238E27FC236}">
+                  <a16:creationId xmlns:a16="http://schemas.microsoft.com/office/drawing/2014/main" id="{8E6B2E8F-9C5A-EA46-9EF4-BB4DD64A40CF}"/>
+                </a:ext>
+              </a:extLst>
+            </p:cNvPr>
+            <p:cNvSpPr txBox="1"/>
+            <p:nvPr/>
+          </p:nvSpPr>
+          <p:spPr>
+            <a:xfrm>
+              <a:off x="7806507" y="3053230"/>
+              <a:ext cx="1966530" cy="661720"/>
+            </a:xfrm>
+            <a:prstGeom prst="rect">
+              <a:avLst/>
+            </a:prstGeom>
+            <a:noFill/>
+            <a:ln>
+              <a:solidFill>
+                <a:schemeClr val="accent6"/>
+              </a:solidFill>
+            </a:ln>
+          </p:spPr>
+          <p:txBody>
+            <a:bodyPr wrap="square" rtlCol="0">
+              <a:spAutoFit/>
+            </a:bodyPr>
+            <a:lstStyle/>
+            <a:p>
+              <a:r>
+                <a:rPr lang="en-US" sz="1100" dirty="0" err="1">
+                  <a:latin typeface="Courier New" charset="0"/>
+                  <a:ea typeface="Courier New" charset="0"/>
+                  <a:cs typeface="Courier New" charset="0"/>
+                </a:rPr>
+                <a:t>FieldSet.from_xarray</a:t>
+              </a:r>
+              <a:endParaRPr lang="en-US" sz="1100" dirty="0">
+                <a:latin typeface="Courier New" charset="0"/>
+                <a:ea typeface="Courier New" charset="0"/>
+                <a:cs typeface="Courier New" charset="0"/>
+              </a:endParaRPr>
+            </a:p>
+            <a:p>
+              <a:r>
+                <a:rPr lang="en-US" sz="1300" dirty="0">
+                  <a:ea typeface="Courier New" charset="0"/>
+                  <a:cs typeface="Courier New" charset="0"/>
+                </a:rPr>
+                <a:t>can directly parse </a:t>
+              </a:r>
+              <a:r>
+                <a:rPr lang="en-US" sz="1100" dirty="0" err="1">
+                  <a:latin typeface="Courier New" panose="02070309020205020404" pitchFamily="49" charset="0"/>
+                  <a:ea typeface="Courier New" charset="0"/>
+                  <a:cs typeface="Courier New" panose="02070309020205020404" pitchFamily="49" charset="0"/>
+                </a:rPr>
+                <a:t>xarray</a:t>
+              </a:r>
+              <a:r>
+                <a:rPr lang="en-US" sz="1300" dirty="0">
+                  <a:ea typeface="Courier New" charset="0"/>
+                  <a:cs typeface="Courier New" charset="0"/>
+                </a:rPr>
+                <a:t> objects into Parcels.</a:t>
+              </a:r>
+              <a:endParaRPr lang="en-US" sz="1300" dirty="0"/>
+            </a:p>
+          </p:txBody>
+        </p:sp>
+      </p:grpSp>
+      <p:cxnSp>
+        <p:nvCxnSpPr>
+          <p:cNvPr id="43" name="Elbow Connector 42">
+            <a:extLst>
+              <a:ext uri="{FF2B5EF4-FFF2-40B4-BE49-F238E27FC236}">
+                <a16:creationId xmlns:a16="http://schemas.microsoft.com/office/drawing/2014/main" id="{3BC715C4-D119-1F49-8BB5-7310B88A2859}"/>
+              </a:ext>
+            </a:extLst>
+          </p:cNvPr>
+          <p:cNvCxnSpPr>
+            <a:cxnSpLocks/>
+            <a:stCxn id="42" idx="3"/>
+            <a:endCxn id="5" idx="1"/>
+          </p:cNvCxnSpPr>
+          <p:nvPr/>
+        </p:nvCxnSpPr>
+        <p:spPr>
+          <a:xfrm flipV="1">
+            <a:off x="2055134" y="4707961"/>
+            <a:ext cx="500867" cy="1232225"/>
+          </a:xfrm>
+          <a:prstGeom prst="bentConnector3">
+            <a:avLst>
+              <a:gd name="adj1" fmla="val 50000"/>
+            </a:avLst>
           </a:prstGeom>
           <a:ln>
             <a:solidFill>
@@ -5327,6 +5987,78 @@
                       </p:childTnLst>
                     </p:cTn>
                   </p:par>
+                  <p:par>
+                    <p:cTn id="51" fill="hold">
+                      <p:stCondLst>
+                        <p:cond delay="indefinite"/>
+                      </p:stCondLst>
+                      <p:childTnLst>
+                        <p:par>
+                          <p:cTn id="52" fill="hold">
+                            <p:stCondLst>
+                              <p:cond delay="0"/>
+                            </p:stCondLst>
+                            <p:childTnLst>
+                              <p:par>
+                                <p:cTn id="53" presetID="1" presetClass="entr" presetSubtype="0" fill="hold" nodeType="clickEffect">
+                                  <p:stCondLst>
+                                    <p:cond delay="0"/>
+                                  </p:stCondLst>
+                                  <p:childTnLst>
+                                    <p:set>
+                                      <p:cBhvr>
+                                        <p:cTn id="54" dur="1" fill="hold">
+                                          <p:stCondLst>
+                                            <p:cond delay="0"/>
+                                          </p:stCondLst>
+                                        </p:cTn>
+                                        <p:tgtEl>
+                                          <p:spTgt spid="40"/>
+                                        </p:tgtEl>
+                                        <p:attrNameLst>
+                                          <p:attrName>style.visibility</p:attrName>
+                                        </p:attrNameLst>
+                                      </p:cBhvr>
+                                      <p:to>
+                                        <p:strVal val="visible"/>
+                                      </p:to>
+                                    </p:set>
+                                  </p:childTnLst>
+                                </p:cTn>
+                              </p:par>
+                              <p:par>
+                                <p:cTn id="55" presetID="1" presetClass="entr" presetSubtype="0" fill="hold" nodeType="withEffect">
+                                  <p:stCondLst>
+                                    <p:cond delay="0"/>
+                                  </p:stCondLst>
+                                  <p:childTnLst>
+                                    <p:set>
+                                      <p:cBhvr>
+                                        <p:cTn id="56" dur="1" fill="hold">
+                                          <p:stCondLst>
+                                            <p:cond delay="0"/>
+                                          </p:stCondLst>
+                                        </p:cTn>
+                                        <p:tgtEl>
+                                          <p:spTgt spid="43"/>
+                                        </p:tgtEl>
+                                        <p:attrNameLst>
+                                          <p:attrName>style.visibility</p:attrName>
+                                        </p:attrNameLst>
+                                      </p:cBhvr>
+                                      <p:to>
+                                        <p:strVal val="visible"/>
+                                      </p:to>
+                                    </p:set>
+                                  </p:childTnLst>
+                                </p:cTn>
+                              </p:par>
+                            </p:childTnLst>
+                          </p:cTn>
+                        </p:par>
+                      </p:childTnLst>
+                    </p:cTn>
+                  </p:par>
                 </p:childTnLst>
               </p:cTn>
               <p:prevCondLst>
@@ -5611,4 +6343,299 @@
     </a:ext>
   </a:extLst>
 </a:theme>
+</file>
+
+<file path=ppt/theme/theme2.xml><?xml version="1.0" encoding="utf-8"?>
+<a:theme xmlns:a="http://schemas.openxmlformats.org/drawingml/2006/main" name="Office Theme">
+  <a:themeElements>
+    <a:clrScheme name="Office">
+      <a:dk1>
+        <a:sysClr val="windowText" lastClr="000000"/>
+      </a:dk1>
+      <a:lt1>
+        <a:sysClr val="window" lastClr="FFFFFF"/>
+      </a:lt1>
+      <a:dk2>
+        <a:srgbClr val="44546A"/>
+      </a:dk2>
+      <a:lt2>
+        <a:srgbClr val="E7E6E6"/>
+      </a:lt2>
+      <a:accent1>
+        <a:srgbClr val="4472C4"/>
+      </a:accent1>
+      <a:accent2>
+        <a:srgbClr val="ED7D31"/>
+      </a:accent2>
+      <a:accent3>
+        <a:srgbClr val="A5A5A5"/>
+      </a:accent3>
+      <a:accent4>
+        <a:srgbClr val="FFC000"/>
+      </a:accent4>
+      <a:accent5>
+        <a:srgbClr val="5B9BD5"/>
+      </a:accent5>
+      <a:accent6>
+        <a:srgbClr val="70AD47"/>
+      </a:accent6>
+      <a:hlink>
+        <a:srgbClr val="0563C1"/>
+      </a:hlink>
+      <a:folHlink>
+        <a:srgbClr val="954F72"/>
+      </a:folHlink>
+    </a:clrScheme>
+    <a:fontScheme name="Office">
+      <a:majorFont>
+        <a:latin typeface="Calibri Light" panose="020F0302020204030204"/>
+        <a:ea typeface=""/>
+        <a:cs typeface=""/>
+        <a:font script="Jpan" typeface="游ゴシック Light"/>
+        <a:font script="Hang" typeface="맑은 고딕"/>
+        <a:font script="Hans" typeface="等线 Light"/>
+        <a:font script="Hant" typeface="新細明體"/>
+        <a:font script="Arab" typeface="Times New Roman"/>
+        <a:font script="Hebr" typeface="Times New Roman"/>
+        <a:font script="Thai" typeface="Angsana New"/>
+        <a:font script="Ethi" typeface="Nyala"/>
+        <a:font script="Beng" typeface="Vrinda"/>
+        <a:font script="Gujr" typeface="Shruti"/>
+        <a:font script="Khmr" typeface="MoolBoran"/>
+        <a:font script="Knda" typeface="Tunga"/>
+        <a:font script="Guru" typeface="Raavi"/>
+        <a:font script="Cans" typeface="Euphemia"/>
+        <a:font script="Cher" typeface="Plantagenet Cherokee"/>
+        <a:font script="Yiii" typeface="Microsoft Yi Baiti"/>
+        <a:font script="Tibt" typeface="Microsoft Himalaya"/>
+        <a:font script="Thaa" typeface="MV Boli"/>
+        <a:font script="Deva" typeface="Mangal"/>
+        <a:font script="Telu" typeface="Gautami"/>
+        <a:font script="Taml" typeface="Latha"/>
+        <a:font script="Syrc" typeface="Estrangelo Edessa"/>
+        <a:font script="Orya" typeface="Kalinga"/>
+        <a:font script="Mlym" typeface="Kartika"/>
+        <a:font script="Laoo" typeface="DokChampa"/>
+        <a:font script="Sinh" typeface="Iskoola Pota"/>
+        <a:font script="Mong" typeface="Mongolian Baiti"/>
+        <a:font script="Viet" typeface="Times New Roman"/>
+        <a:font script="Uigh" typeface="Microsoft Uighur"/>
+        <a:font script="Geor" typeface="Sylfaen"/>
+        <a:font script="Armn" typeface="Arial"/>
+        <a:font script="Bugi" typeface="Leelawadee UI"/>
+        <a:font script="Bopo" typeface="Microsoft JhengHei"/>
+        <a:font script="Java" typeface="Javanese Text"/>
+        <a:font script="Lisu" typeface="Segoe UI"/>
+        <a:font script="Mymr" typeface="Myanmar Text"/>
+        <a:font script="Nkoo" typeface="Ebrima"/>
+        <a:font script="Olck" typeface="Nirmala UI"/>
+        <a:font script="Osma" typeface="Ebrima"/>
+        <a:font script="Phag" typeface="Phagspa"/>
+        <a:font script="Syrn" typeface="Estrangelo Edessa"/>
+        <a:font script="Syrj" typeface="Estrangelo Edessa"/>
+        <a:font script="Syre" typeface="Estrangelo Edessa"/>
+        <a:font script="Sora" typeface="Nirmala UI"/>
+        <a:font script="Tale" typeface="Microsoft Tai Le"/>
+        <a:font script="Talu" typeface="Microsoft New Tai Lue"/>
+        <a:font script="Tfng" typeface="Ebrima"/>
+      </a:majorFont>
+      <a:minorFont>
+        <a:latin typeface="Calibri" panose="020F0502020204030204"/>
+        <a:ea typeface=""/>
+        <a:cs typeface=""/>
+        <a:font script="Jpan" typeface="游ゴシック"/>
+        <a:font script="Hang" typeface="맑은 고딕"/>
+        <a:font script="Hans" typeface="等线"/>
+        <a:font script="Hant" typeface="新細明體"/>
+        <a:font script="Arab" typeface="Arial"/>
+        <a:font script="Hebr" typeface="Arial"/>
+        <a:font script="Thai" typeface="Cordia New"/>
+        <a:font script="Ethi" typeface="Nyala"/>
+        <a:font script="Beng" typeface="Vrinda"/>
+        <a:font script="Gujr" typeface="Shruti"/>
+        <a:font script="Khmr" typeface="DaunPenh"/>
+        <a:font script="Knda" typeface="Tunga"/>
+        <a:font script="Guru" typeface="Raavi"/>
+        <a:font script="Cans" typeface="Euphemia"/>
+        <a:font script="Cher" typeface="Plantagenet Cherokee"/>
+        <a:font script="Yiii" typeface="Microsoft Yi Baiti"/>
+        <a:font script="Tibt" typeface="Microsoft Himalaya"/>
+        <a:font script="Thaa" typeface="MV Boli"/>
+        <a:font script="Deva" typeface="Mangal"/>
+        <a:font script="Telu" typeface="Gautami"/>
+        <a:font script="Taml" typeface="Latha"/>
+        <a:font script="Syrc" typeface="Estrangelo Edessa"/>
+        <a:font script="Orya" typeface="Kalinga"/>
+        <a:font script="Mlym" typeface="Kartika"/>
+        <a:font script="Laoo" typeface="DokChampa"/>
+        <a:font script="Sinh" typeface="Iskoola Pota"/>
+        <a:font script="Mong" typeface="Mongolian Baiti"/>
+        <a:font script="Viet" typeface="Arial"/>
+        <a:font script="Uigh" typeface="Microsoft Uighur"/>
+        <a:font script="Geor" typeface="Sylfaen"/>
+        <a:font script="Armn" typeface="Arial"/>
+        <a:font script="Bugi" typeface="Leelawadee UI"/>
+        <a:font script="Bopo" typeface="Microsoft JhengHei"/>
+        <a:font script="Java" typeface="Javanese Text"/>
+        <a:font script="Lisu" typeface="Segoe UI"/>
+        <a:font script="Mymr" typeface="Myanmar Text"/>
+        <a:font script="Nkoo" typeface="Ebrima"/>
+        <a:font script="Olck" typeface="Nirmala UI"/>
+        <a:font script="Osma" typeface="Ebrima"/>
+        <a:font script="Phag" typeface="Phagspa"/>
+        <a:font script="Syrn" typeface="Estrangelo Edessa"/>
+        <a:font script="Syrj" typeface="Estrangelo Edessa"/>
+        <a:font script="Syre" typeface="Estrangelo Edessa"/>
+        <a:font script="Sora" typeface="Nirmala UI"/>
+        <a:font script="Tale" typeface="Microsoft Tai Le"/>
+        <a:font script="Talu" typeface="Microsoft New Tai Lue"/>
+        <a:font script="Tfng" typeface="Ebrima"/>
+      </a:minorFont>
+    </a:fontScheme>
+    <a:fmtScheme name="Office">
+      <a:fillStyleLst>
+        <a:solidFill>
+          <a:schemeClr val="phClr"/>
+        </a:solidFill>
+        <a:gradFill rotWithShape="1">
+          <a:gsLst>
+            <a:gs pos="0">
+              <a:schemeClr val="phClr">
+                <a:lumMod val="110000"/>
+                <a:satMod val="105000"/>
+                <a:tint val="67000"/>
+              </a:schemeClr>
+            </a:gs>
+            <a:gs pos="50000">
+              <a:schemeClr val="phClr">
+                <a:lumMod val="105000"/>
+                <a:satMod val="103000"/>
+                <a:tint val="73000"/>
+              </a:schemeClr>
+            </a:gs>
+            <a:gs pos="100000">
+              <a:schemeClr val="phClr">
+                <a:lumMod val="105000"/>
+                <a:satMod val="109000"/>
+                <a:tint val="81000"/>
+              </a:schemeClr>
+            </a:gs>
+          </a:gsLst>
+          <a:lin ang="5400000" scaled="0"/>
+        </a:gradFill>
+        <a:gradFill rotWithShape="1">
+          <a:gsLst>
+            <a:gs pos="0">
+              <a:schemeClr val="phClr">
+                <a:satMod val="103000"/>
+                <a:lumMod val="102000"/>
+                <a:tint val="94000"/>
+              </a:schemeClr>
+            </a:gs>
+            <a:gs pos="50000">
+              <a:schemeClr val="phClr">
+                <a:satMod val="110000"/>
+                <a:lumMod val="100000"/>
+                <a:shade val="100000"/>
+              </a:schemeClr>
+            </a:gs>
+            <a:gs pos="100000">
+              <a:schemeClr val="phClr">
+                <a:lumMod val="99000"/>
+                <a:satMod val="120000"/>
+                <a:shade val="78000"/>
+              </a:schemeClr>
+            </a:gs>
+          </a:gsLst>
+          <a:lin ang="5400000" scaled="0"/>
+        </a:gradFill>
+      </a:fillStyleLst>
+      <a:lnStyleLst>
+        <a:ln w="6350" cap="flat" cmpd="sng" algn="ctr">
+          <a:solidFill>
+            <a:schemeClr val="phClr"/>
+          </a:solidFill>
+          <a:prstDash val="solid"/>
+          <a:miter lim="800000"/>
+        </a:ln>
+        <a:ln w="12700" cap="flat" cmpd="sng" algn="ctr">
+          <a:solidFill>
+            <a:schemeClr val="phClr"/>
+          </a:solidFill>
+          <a:prstDash val="solid"/>
+          <a:miter lim="800000"/>
+        </a:ln>
+        <a:ln w="19050" cap="flat" cmpd="sng" algn="ctr">
+          <a:solidFill>
+            <a:schemeClr val="phClr"/>
+          </a:solidFill>
+          <a:prstDash val="solid"/>
+          <a:miter lim="800000"/>
+        </a:ln>
+      </a:lnStyleLst>
+      <a:effectStyleLst>
+        <a:effectStyle>
+          <a:effectLst/>
+        </a:effectStyle>
+        <a:effectStyle>
+          <a:effectLst/>
+        </a:effectStyle>
+        <a:effectStyle>
+          <a:effectLst>
+            <a:outerShdw blurRad="57150" dist="19050" dir="5400000" algn="ctr" rotWithShape="0">
+              <a:srgbClr val="000000">
+                <a:alpha val="63000"/>
+              </a:srgbClr>
+            </a:outerShdw>
+          </a:effectLst>
+        </a:effectStyle>
+      </a:effectStyleLst>
+      <a:bgFillStyleLst>
+        <a:solidFill>
+          <a:schemeClr val="phClr"/>
+        </a:solidFill>
+        <a:solidFill>
+          <a:schemeClr val="phClr">
+            <a:tint val="95000"/>
+            <a:satMod val="170000"/>
+          </a:schemeClr>
+        </a:solidFill>
+        <a:gradFill rotWithShape="1">
+          <a:gsLst>
+            <a:gs pos="0">
+              <a:schemeClr val="phClr">
+                <a:tint val="93000"/>
+                <a:satMod val="150000"/>
+                <a:shade val="98000"/>
+                <a:lumMod val="102000"/>
+              </a:schemeClr>
+            </a:gs>
+            <a:gs pos="50000">
+              <a:schemeClr val="phClr">
+                <a:tint val="98000"/>
+                <a:satMod val="130000"/>
+                <a:shade val="90000"/>
+                <a:lumMod val="103000"/>
+              </a:schemeClr>
+            </a:gs>
+            <a:gs pos="100000">
+              <a:schemeClr val="phClr">
+                <a:shade val="63000"/>
+                <a:satMod val="120000"/>
+              </a:schemeClr>
+            </a:gs>
+          </a:gsLst>
+          <a:lin ang="5400000" scaled="0"/>
+        </a:gradFill>
+      </a:bgFillStyleLst>
+    </a:fmtScheme>
+  </a:themeElements>
+  <a:objectDefaults/>
+  <a:extraClrSchemeLst/>
+  <a:extLst>
+    <a:ext uri="{05A4C25C-085E-4340-85A3-A5531E510DB2}">
+      <thm15:themeFamily xmlns:thm15="http://schemas.microsoft.com/office/thememl/2012/main" name="Office Theme" id="{62F939B6-93AF-4DB8-9C6B-D6C7DFDC589F}" vid="{4A3C46E8-61CC-4603-A589-7422A47A8E4A}"/>
+    </a:ext>
+  </a:extLst>
+</a:theme>
 </file>
</xml_diff>

<commit_message>
Fixing type-o in 'built-in' in Kernels box of design schematic
</commit_message>
<xml_diff>
--- a/images/parcelsdesign.pptx
+++ b/images/parcelsdesign.pptx
@@ -197,7 +197,7 @@
           <a:p>
             <a:fld id="{76BA1978-A596-F141-97E6-8C4865C5F65E}" type="datetimeFigureOut">
               <a:rPr lang="en-US" smtClean="0"/>
-              <a:t>2/7/20</a:t>
+              <a:t>2/27/20</a:t>
             </a:fld>
             <a:endParaRPr lang="en-US"/>
           </a:p>
@@ -678,7 +678,7 @@
           <a:p>
             <a:fld id="{7D3EDCAD-2FF9-9B40-90C5-6D68A2560007}" type="datetimeFigureOut">
               <a:rPr lang="en-US" smtClean="0"/>
-              <a:t>2/7/20</a:t>
+              <a:t>2/27/20</a:t>
             </a:fld>
             <a:endParaRPr lang="en-US"/>
           </a:p>
@@ -846,7 +846,7 @@
           <a:p>
             <a:fld id="{7D3EDCAD-2FF9-9B40-90C5-6D68A2560007}" type="datetimeFigureOut">
               <a:rPr lang="en-US" smtClean="0"/>
-              <a:t>2/7/20</a:t>
+              <a:t>2/27/20</a:t>
             </a:fld>
             <a:endParaRPr lang="en-US"/>
           </a:p>
@@ -1024,7 +1024,7 @@
           <a:p>
             <a:fld id="{7D3EDCAD-2FF9-9B40-90C5-6D68A2560007}" type="datetimeFigureOut">
               <a:rPr lang="en-US" smtClean="0"/>
-              <a:t>2/7/20</a:t>
+              <a:t>2/27/20</a:t>
             </a:fld>
             <a:endParaRPr lang="en-US"/>
           </a:p>
@@ -1192,7 +1192,7 @@
           <a:p>
             <a:fld id="{7D3EDCAD-2FF9-9B40-90C5-6D68A2560007}" type="datetimeFigureOut">
               <a:rPr lang="en-US" smtClean="0"/>
-              <a:t>2/7/20</a:t>
+              <a:t>2/27/20</a:t>
             </a:fld>
             <a:endParaRPr lang="en-US"/>
           </a:p>
@@ -1437,7 +1437,7 @@
           <a:p>
             <a:fld id="{7D3EDCAD-2FF9-9B40-90C5-6D68A2560007}" type="datetimeFigureOut">
               <a:rPr lang="en-US" smtClean="0"/>
-              <a:t>2/7/20</a:t>
+              <a:t>2/27/20</a:t>
             </a:fld>
             <a:endParaRPr lang="en-US"/>
           </a:p>
@@ -1666,7 +1666,7 @@
           <a:p>
             <a:fld id="{7D3EDCAD-2FF9-9B40-90C5-6D68A2560007}" type="datetimeFigureOut">
               <a:rPr lang="en-US" smtClean="0"/>
-              <a:t>2/7/20</a:t>
+              <a:t>2/27/20</a:t>
             </a:fld>
             <a:endParaRPr lang="en-US"/>
           </a:p>
@@ -2030,7 +2030,7 @@
           <a:p>
             <a:fld id="{7D3EDCAD-2FF9-9B40-90C5-6D68A2560007}" type="datetimeFigureOut">
               <a:rPr lang="en-US" smtClean="0"/>
-              <a:t>2/7/20</a:t>
+              <a:t>2/27/20</a:t>
             </a:fld>
             <a:endParaRPr lang="en-US"/>
           </a:p>
@@ -2147,7 +2147,7 @@
           <a:p>
             <a:fld id="{7D3EDCAD-2FF9-9B40-90C5-6D68A2560007}" type="datetimeFigureOut">
               <a:rPr lang="en-US" smtClean="0"/>
-              <a:t>2/7/20</a:t>
+              <a:t>2/27/20</a:t>
             </a:fld>
             <a:endParaRPr lang="en-US"/>
           </a:p>
@@ -2242,7 +2242,7 @@
           <a:p>
             <a:fld id="{7D3EDCAD-2FF9-9B40-90C5-6D68A2560007}" type="datetimeFigureOut">
               <a:rPr lang="en-US" smtClean="0"/>
-              <a:t>2/7/20</a:t>
+              <a:t>2/27/20</a:t>
             </a:fld>
             <a:endParaRPr lang="en-US"/>
           </a:p>
@@ -2517,7 +2517,7 @@
           <a:p>
             <a:fld id="{7D3EDCAD-2FF9-9B40-90C5-6D68A2560007}" type="datetimeFigureOut">
               <a:rPr lang="en-US" smtClean="0"/>
-              <a:t>2/7/20</a:t>
+              <a:t>2/27/20</a:t>
             </a:fld>
             <a:endParaRPr lang="en-US"/>
           </a:p>
@@ -2769,7 +2769,7 @@
           <a:p>
             <a:fld id="{7D3EDCAD-2FF9-9B40-90C5-6D68A2560007}" type="datetimeFigureOut">
               <a:rPr lang="en-US" smtClean="0"/>
-              <a:t>2/7/20</a:t>
+              <a:t>2/27/20</a:t>
             </a:fld>
             <a:endParaRPr lang="en-US"/>
           </a:p>
@@ -2980,7 +2980,7 @@
           <a:p>
             <a:fld id="{7D3EDCAD-2FF9-9B40-90C5-6D68A2560007}" type="datetimeFigureOut">
               <a:rPr lang="en-US" smtClean="0"/>
-              <a:t>2/7/20</a:t>
+              <a:t>2/27/20</a:t>
             </a:fld>
             <a:endParaRPr lang="en-US"/>
           </a:p>
@@ -4357,7 +4357,7 @@
               </a:r>
               <a:r>
                 <a:rPr lang="en-US" sz="1300" dirty="0"/>
-                <a:t> is executed. Parcels comes with some build-in kernels like 4</a:t>
+                <a:t> is executed. Parcels comes with some built-in kernels like 4</a:t>
               </a:r>
               <a:r>
                 <a:rPr lang="en-US" sz="1300" baseline="30000" dirty="0"/>
@@ -4365,11 +4365,11 @@
               </a:r>
               <a:r>
                 <a:rPr lang="en-US" sz="1300" dirty="0"/>
-                <a:t> order </a:t>
+                <a:t> order Runge-</a:t>
               </a:r>
               <a:r>
                 <a:rPr lang="en-US" sz="1300" dirty="0" err="1"/>
-                <a:t>Runge-Kutta</a:t>
+                <a:t>Kutta</a:t>
               </a:r>
               <a:r>
                 <a:rPr lang="en-US" sz="1300" dirty="0"/>

</xml_diff>